<commit_message>
updated PPT. added Tableau Charts
</commit_message>
<xml_diff>
--- a/Final_Project/CA Housing Prices Analysis.pptx
+++ b/Final_Project/CA Housing Prices Analysis.pptx
@@ -5,7 +5,7 @@
     <p:sldMasterId id="2147483712" r:id="rId4"/>
   </p:sldMasterIdLst>
   <p:notesMasterIdLst>
-    <p:notesMasterId r:id="rId23"/>
+    <p:notesMasterId r:id="rId26"/>
   </p:notesMasterIdLst>
   <p:sldIdLst>
     <p:sldId id="259" r:id="rId5"/>
@@ -16,16 +16,19 @@
     <p:sldId id="278" r:id="rId10"/>
     <p:sldId id="270" r:id="rId11"/>
     <p:sldId id="267" r:id="rId12"/>
-    <p:sldId id="264" r:id="rId13"/>
-    <p:sldId id="263" r:id="rId14"/>
-    <p:sldId id="273" r:id="rId15"/>
-    <p:sldId id="261" r:id="rId16"/>
-    <p:sldId id="262" r:id="rId17"/>
-    <p:sldId id="265" r:id="rId18"/>
-    <p:sldId id="271" r:id="rId19"/>
-    <p:sldId id="272" r:id="rId20"/>
-    <p:sldId id="274" r:id="rId21"/>
-    <p:sldId id="275" r:id="rId22"/>
+    <p:sldId id="257" r:id="rId13"/>
+    <p:sldId id="280" r:id="rId14"/>
+    <p:sldId id="281" r:id="rId15"/>
+    <p:sldId id="264" r:id="rId16"/>
+    <p:sldId id="263" r:id="rId17"/>
+    <p:sldId id="273" r:id="rId18"/>
+    <p:sldId id="261" r:id="rId19"/>
+    <p:sldId id="262" r:id="rId20"/>
+    <p:sldId id="265" r:id="rId21"/>
+    <p:sldId id="271" r:id="rId22"/>
+    <p:sldId id="272" r:id="rId23"/>
+    <p:sldId id="274" r:id="rId24"/>
+    <p:sldId id="275" r:id="rId25"/>
   </p:sldIdLst>
   <p:sldSz cx="12192000" cy="6858000"/>
   <p:notesSz cx="6858000" cy="9144000"/>
@@ -135,7 +138,7 @@
 <file path=ppt/revisionInfo.xml><?xml version="1.0" encoding="utf-8"?>
 <p1510:revInfo xmlns:a="http://schemas.openxmlformats.org/drawingml/2006/main" xmlns:r="http://schemas.openxmlformats.org/officeDocument/2006/relationships" xmlns:p1510="http://schemas.microsoft.com/office/powerpoint/2015/10/main">
   <p1510:revLst>
-    <p1510:client id="{F255ABD9-DD32-49C2-95D1-D3F9DBAF0468}" v="1" dt="2021-08-16T07:04:11.095"/>
+    <p1510:client id="{F255ABD9-DD32-49C2-95D1-D3F9DBAF0468}" v="4" dt="2021-08-16T07:17:32.427"/>
   </p1510:revLst>
 </p1510:revInfo>
 </file>
@@ -487,16 +490,710 @@
   </pc:docChgLst>
   <pc:docChgLst>
     <pc:chgData name="mikez zaatri" userId="dc7c058cd1c617f1" providerId="LiveId" clId="{F255ABD9-DD32-49C2-95D1-D3F9DBAF0468}"/>
-    <pc:docChg chg="addSld delSld modSld">
-      <pc:chgData name="mikez zaatri" userId="dc7c058cd1c617f1" providerId="LiveId" clId="{F255ABD9-DD32-49C2-95D1-D3F9DBAF0468}" dt="2021-08-16T07:04:11.092" v="1"/>
+    <pc:docChg chg="undo custSel addSld delSld modSld">
+      <pc:chgData name="mikez zaatri" userId="dc7c058cd1c617f1" providerId="LiveId" clId="{F255ABD9-DD32-49C2-95D1-D3F9DBAF0468}" dt="2021-08-16T07:25:32.276" v="761" actId="6549"/>
       <pc:docMkLst>
         <pc:docMk/>
       </pc:docMkLst>
+      <pc:sldChg chg="addSp delSp modSp add mod setBg modClrScheme setClrOvrMap delDesignElem chgLayout">
+        <pc:chgData name="mikez zaatri" userId="dc7c058cd1c617f1" providerId="LiveId" clId="{F255ABD9-DD32-49C2-95D1-D3F9DBAF0468}" dt="2021-08-16T07:20:15.446" v="255" actId="26606"/>
+        <pc:sldMkLst>
+          <pc:docMk/>
+          <pc:sldMk cId="95992585" sldId="257"/>
+        </pc:sldMkLst>
+        <pc:spChg chg="add del mod ord">
+          <ac:chgData name="mikez zaatri" userId="dc7c058cd1c617f1" providerId="LiveId" clId="{F255ABD9-DD32-49C2-95D1-D3F9DBAF0468}" dt="2021-08-16T07:11:32.555" v="47" actId="478"/>
+          <ac:spMkLst>
+            <pc:docMk/>
+            <pc:sldMk cId="95992585" sldId="257"/>
+            <ac:spMk id="3" creationId="{7FAFC4F9-3D37-4D05-98AC-2A59A56328CC}"/>
+          </ac:spMkLst>
+        </pc:spChg>
+        <pc:spChg chg="add del mod ord">
+          <ac:chgData name="mikez zaatri" userId="dc7c058cd1c617f1" providerId="LiveId" clId="{F255ABD9-DD32-49C2-95D1-D3F9DBAF0468}" dt="2021-08-16T07:11:40.219" v="49" actId="478"/>
+          <ac:spMkLst>
+            <pc:docMk/>
+            <pc:sldMk cId="95992585" sldId="257"/>
+            <ac:spMk id="4" creationId="{FA3D2BEE-72B1-4A76-BC70-BE7DE56090B4}"/>
+          </ac:spMkLst>
+        </pc:spChg>
+        <pc:spChg chg="add del mod ord">
+          <ac:chgData name="mikez zaatri" userId="dc7c058cd1c617f1" providerId="LiveId" clId="{F255ABD9-DD32-49C2-95D1-D3F9DBAF0468}" dt="2021-08-16T07:11:33.923" v="48" actId="478"/>
+          <ac:spMkLst>
+            <pc:docMk/>
+            <pc:sldMk cId="95992585" sldId="257"/>
+            <ac:spMk id="5" creationId="{AF2B1E7B-3911-4DD9-BB2A-C98CC6F36EA3}"/>
+          </ac:spMkLst>
+        </pc:spChg>
+        <pc:spChg chg="add mod ord">
+          <ac:chgData name="mikez zaatri" userId="dc7c058cd1c617f1" providerId="LiveId" clId="{F255ABD9-DD32-49C2-95D1-D3F9DBAF0468}" dt="2021-08-16T07:20:15.446" v="255" actId="26606"/>
+          <ac:spMkLst>
+            <pc:docMk/>
+            <pc:sldMk cId="95992585" sldId="257"/>
+            <ac:spMk id="8" creationId="{26C39FAB-5AD5-4AF2-8970-761429E3AEFC}"/>
+          </ac:spMkLst>
+        </pc:spChg>
+        <pc:spChg chg="add del mod ord">
+          <ac:chgData name="mikez zaatri" userId="dc7c058cd1c617f1" providerId="LiveId" clId="{F255ABD9-DD32-49C2-95D1-D3F9DBAF0468}" dt="2021-08-16T07:15:34.923" v="118" actId="478"/>
+          <ac:spMkLst>
+            <pc:docMk/>
+            <pc:sldMk cId="95992585" sldId="257"/>
+            <ac:spMk id="9" creationId="{1DC9C372-3062-43E3-AD3B-DA4FDD4A1787}"/>
+          </ac:spMkLst>
+        </pc:spChg>
+        <pc:spChg chg="add mod ord">
+          <ac:chgData name="mikez zaatri" userId="dc7c058cd1c617f1" providerId="LiveId" clId="{F255ABD9-DD32-49C2-95D1-D3F9DBAF0468}" dt="2021-08-16T07:20:15.446" v="255" actId="26606"/>
+          <ac:spMkLst>
+            <pc:docMk/>
+            <pc:sldMk cId="95992585" sldId="257"/>
+            <ac:spMk id="10" creationId="{B5FEDBAE-ABA3-4F3C-AA95-96E298B91A08}"/>
+          </ac:spMkLst>
+        </pc:spChg>
+        <pc:spChg chg="add del">
+          <ac:chgData name="mikez zaatri" userId="dc7c058cd1c617f1" providerId="LiveId" clId="{F255ABD9-DD32-49C2-95D1-D3F9DBAF0468}" dt="2021-08-16T07:13:07.886" v="79" actId="26606"/>
+          <ac:spMkLst>
+            <pc:docMk/>
+            <pc:sldMk cId="95992585" sldId="257"/>
+            <ac:spMk id="12" creationId="{1DDC3EF6-2EA5-44B3-94C7-9DDA67A127D0}"/>
+          </ac:spMkLst>
+        </pc:spChg>
+        <pc:spChg chg="add del">
+          <ac:chgData name="mikez zaatri" userId="dc7c058cd1c617f1" providerId="LiveId" clId="{F255ABD9-DD32-49C2-95D1-D3F9DBAF0468}" dt="2021-08-16T07:13:07.886" v="79" actId="26606"/>
+          <ac:spMkLst>
+            <pc:docMk/>
+            <pc:sldMk cId="95992585" sldId="257"/>
+            <ac:spMk id="14" creationId="{87925A9A-E9FA-496E-9C09-7C2845E0062B}"/>
+          </ac:spMkLst>
+        </pc:spChg>
+        <pc:spChg chg="add del">
+          <ac:chgData name="mikez zaatri" userId="dc7c058cd1c617f1" providerId="LiveId" clId="{F255ABD9-DD32-49C2-95D1-D3F9DBAF0468}" dt="2021-08-16T07:13:07.886" v="79" actId="26606"/>
+          <ac:spMkLst>
+            <pc:docMk/>
+            <pc:sldMk cId="95992585" sldId="257"/>
+            <ac:spMk id="16" creationId="{2073ABB4-E164-4CBF-ADFF-25552BB7913B}"/>
+          </ac:spMkLst>
+        </pc:spChg>
+        <pc:spChg chg="add del">
+          <ac:chgData name="mikez zaatri" userId="dc7c058cd1c617f1" providerId="LiveId" clId="{F255ABD9-DD32-49C2-95D1-D3F9DBAF0468}" dt="2021-08-16T07:13:07.886" v="79" actId="26606"/>
+          <ac:spMkLst>
+            <pc:docMk/>
+            <pc:sldMk cId="95992585" sldId="257"/>
+            <ac:spMk id="18" creationId="{1259A422-0023-4292-8200-E080556F30F9}"/>
+          </ac:spMkLst>
+        </pc:spChg>
+        <pc:spChg chg="add del">
+          <ac:chgData name="mikez zaatri" userId="dc7c058cd1c617f1" providerId="LiveId" clId="{F255ABD9-DD32-49C2-95D1-D3F9DBAF0468}" dt="2021-08-16T07:13:07.886" v="79" actId="26606"/>
+          <ac:spMkLst>
+            <pc:docMk/>
+            <pc:sldMk cId="95992585" sldId="257"/>
+            <ac:spMk id="20" creationId="{A2413CA5-4739-4BC9-8BB3-B0A4928D314F}"/>
+          </ac:spMkLst>
+        </pc:spChg>
+        <pc:spChg chg="add del">
+          <ac:chgData name="mikez zaatri" userId="dc7c058cd1c617f1" providerId="LiveId" clId="{F255ABD9-DD32-49C2-95D1-D3F9DBAF0468}" dt="2021-08-16T07:13:10.007" v="81" actId="26606"/>
+          <ac:spMkLst>
+            <pc:docMk/>
+            <pc:sldMk cId="95992585" sldId="257"/>
+            <ac:spMk id="22" creationId="{1264404B-1C0F-4383-8FC3-A3E3264AA4C3}"/>
+          </ac:spMkLst>
+        </pc:spChg>
+        <pc:spChg chg="add del">
+          <ac:chgData name="mikez zaatri" userId="dc7c058cd1c617f1" providerId="LiveId" clId="{F255ABD9-DD32-49C2-95D1-D3F9DBAF0468}" dt="2021-08-16T07:13:10.007" v="81" actId="26606"/>
+          <ac:spMkLst>
+            <pc:docMk/>
+            <pc:sldMk cId="95992585" sldId="257"/>
+            <ac:spMk id="23" creationId="{1DDC3EF6-2EA5-44B3-94C7-9DDA67A127D0}"/>
+          </ac:spMkLst>
+        </pc:spChg>
+        <pc:spChg chg="add del">
+          <ac:chgData name="mikez zaatri" userId="dc7c058cd1c617f1" providerId="LiveId" clId="{F255ABD9-DD32-49C2-95D1-D3F9DBAF0468}" dt="2021-08-16T07:13:10.007" v="81" actId="26606"/>
+          <ac:spMkLst>
+            <pc:docMk/>
+            <pc:sldMk cId="95992585" sldId="257"/>
+            <ac:spMk id="24" creationId="{619F5C88-C232-4D01-8DB1-8A0C673DDBC3}"/>
+          </ac:spMkLst>
+        </pc:spChg>
+        <pc:spChg chg="add del">
+          <ac:chgData name="mikez zaatri" userId="dc7c058cd1c617f1" providerId="LiveId" clId="{F255ABD9-DD32-49C2-95D1-D3F9DBAF0468}" dt="2021-08-16T07:13:10.007" v="81" actId="26606"/>
+          <ac:spMkLst>
+            <pc:docMk/>
+            <pc:sldMk cId="95992585" sldId="257"/>
+            <ac:spMk id="25" creationId="{87925A9A-E9FA-496E-9C09-7C2845E0062B}"/>
+          </ac:spMkLst>
+        </pc:spChg>
+        <pc:spChg chg="add del">
+          <ac:chgData name="mikez zaatri" userId="dc7c058cd1c617f1" providerId="LiveId" clId="{F255ABD9-DD32-49C2-95D1-D3F9DBAF0468}" dt="2021-08-16T07:13:10.007" v="81" actId="26606"/>
+          <ac:spMkLst>
+            <pc:docMk/>
+            <pc:sldMk cId="95992585" sldId="257"/>
+            <ac:spMk id="26" creationId="{1EEE7F17-8E08-4C69-8E22-661908E6DF72}"/>
+          </ac:spMkLst>
+        </pc:spChg>
+        <pc:spChg chg="add del">
+          <ac:chgData name="mikez zaatri" userId="dc7c058cd1c617f1" providerId="LiveId" clId="{F255ABD9-DD32-49C2-95D1-D3F9DBAF0468}" dt="2021-08-16T07:13:10.007" v="81" actId="26606"/>
+          <ac:spMkLst>
+            <pc:docMk/>
+            <pc:sldMk cId="95992585" sldId="257"/>
+            <ac:spMk id="27" creationId="{2073ABB4-E164-4CBF-ADFF-25552BB7913B}"/>
+          </ac:spMkLst>
+        </pc:spChg>
+        <pc:spChg chg="add del">
+          <ac:chgData name="mikez zaatri" userId="dc7c058cd1c617f1" providerId="LiveId" clId="{F255ABD9-DD32-49C2-95D1-D3F9DBAF0468}" dt="2021-08-16T07:13:10.007" v="81" actId="26606"/>
+          <ac:spMkLst>
+            <pc:docMk/>
+            <pc:sldMk cId="95992585" sldId="257"/>
+            <ac:spMk id="28" creationId="{8C266B9D-DC87-430A-8D3A-2E83639A1768}"/>
+          </ac:spMkLst>
+        </pc:spChg>
+        <pc:spChg chg="add del">
+          <ac:chgData name="mikez zaatri" userId="dc7c058cd1c617f1" providerId="LiveId" clId="{F255ABD9-DD32-49C2-95D1-D3F9DBAF0468}" dt="2021-08-16T07:13:10.007" v="81" actId="26606"/>
+          <ac:spMkLst>
+            <pc:docMk/>
+            <pc:sldMk cId="95992585" sldId="257"/>
+            <ac:spMk id="29" creationId="{254B162D-1BD7-41E0-844F-F94AE2CE2B87}"/>
+          </ac:spMkLst>
+        </pc:spChg>
+        <pc:spChg chg="add del">
+          <ac:chgData name="mikez zaatri" userId="dc7c058cd1c617f1" providerId="LiveId" clId="{F255ABD9-DD32-49C2-95D1-D3F9DBAF0468}" dt="2021-08-16T07:20:09.030" v="253" actId="26606"/>
+          <ac:spMkLst>
+            <pc:docMk/>
+            <pc:sldMk cId="95992585" sldId="257"/>
+            <ac:spMk id="30" creationId="{10AE8D57-436A-4073-9A75-15BB5949F8B4}"/>
+          </ac:spMkLst>
+        </pc:spChg>
+        <pc:spChg chg="add del">
+          <ac:chgData name="mikez zaatri" userId="dc7c058cd1c617f1" providerId="LiveId" clId="{F255ABD9-DD32-49C2-95D1-D3F9DBAF0468}" dt="2021-08-16T07:13:11.616" v="83" actId="26606"/>
+          <ac:spMkLst>
+            <pc:docMk/>
+            <pc:sldMk cId="95992585" sldId="257"/>
+            <ac:spMk id="31" creationId="{1DDC3EF6-2EA5-44B3-94C7-9DDA67A127D0}"/>
+          </ac:spMkLst>
+        </pc:spChg>
+        <pc:spChg chg="add del">
+          <ac:chgData name="mikez zaatri" userId="dc7c058cd1c617f1" providerId="LiveId" clId="{F255ABD9-DD32-49C2-95D1-D3F9DBAF0468}" dt="2021-08-16T07:13:11.616" v="83" actId="26606"/>
+          <ac:spMkLst>
+            <pc:docMk/>
+            <pc:sldMk cId="95992585" sldId="257"/>
+            <ac:spMk id="32" creationId="{87925A9A-E9FA-496E-9C09-7C2845E0062B}"/>
+          </ac:spMkLst>
+        </pc:spChg>
+        <pc:spChg chg="add del">
+          <ac:chgData name="mikez zaatri" userId="dc7c058cd1c617f1" providerId="LiveId" clId="{F255ABD9-DD32-49C2-95D1-D3F9DBAF0468}" dt="2021-08-16T07:13:11.616" v="83" actId="26606"/>
+          <ac:spMkLst>
+            <pc:docMk/>
+            <pc:sldMk cId="95992585" sldId="257"/>
+            <ac:spMk id="33" creationId="{2073ABB4-E164-4CBF-ADFF-25552BB7913B}"/>
+          </ac:spMkLst>
+        </pc:spChg>
+        <pc:spChg chg="add del">
+          <ac:chgData name="mikez zaatri" userId="dc7c058cd1c617f1" providerId="LiveId" clId="{F255ABD9-DD32-49C2-95D1-D3F9DBAF0468}" dt="2021-08-16T07:13:11.616" v="83" actId="26606"/>
+          <ac:spMkLst>
+            <pc:docMk/>
+            <pc:sldMk cId="95992585" sldId="257"/>
+            <ac:spMk id="34" creationId="{587D26DA-9773-4A0E-B213-DDF20A1F1F27}"/>
+          </ac:spMkLst>
+        </pc:spChg>
+        <pc:spChg chg="add del">
+          <ac:chgData name="mikez zaatri" userId="dc7c058cd1c617f1" providerId="LiveId" clId="{F255ABD9-DD32-49C2-95D1-D3F9DBAF0468}" dt="2021-08-16T07:20:09.030" v="253" actId="26606"/>
+          <ac:spMkLst>
+            <pc:docMk/>
+            <pc:sldMk cId="95992585" sldId="257"/>
+            <ac:spMk id="35" creationId="{DD651B61-325E-4E73-8445-38B0DE8AAAB6}"/>
+          </ac:spMkLst>
+        </pc:spChg>
+        <pc:spChg chg="add del">
+          <ac:chgData name="mikez zaatri" userId="dc7c058cd1c617f1" providerId="LiveId" clId="{F255ABD9-DD32-49C2-95D1-D3F9DBAF0468}" dt="2021-08-16T07:13:13.096" v="85" actId="26606"/>
+          <ac:spMkLst>
+            <pc:docMk/>
+            <pc:sldMk cId="95992585" sldId="257"/>
+            <ac:spMk id="36" creationId="{1DDC3EF6-2EA5-44B3-94C7-9DDA67A127D0}"/>
+          </ac:spMkLst>
+        </pc:spChg>
+        <pc:spChg chg="add del">
+          <ac:chgData name="mikez zaatri" userId="dc7c058cd1c617f1" providerId="LiveId" clId="{F255ABD9-DD32-49C2-95D1-D3F9DBAF0468}" dt="2021-08-16T07:13:13.096" v="85" actId="26606"/>
+          <ac:spMkLst>
+            <pc:docMk/>
+            <pc:sldMk cId="95992585" sldId="257"/>
+            <ac:spMk id="37" creationId="{87925A9A-E9FA-496E-9C09-7C2845E0062B}"/>
+          </ac:spMkLst>
+        </pc:spChg>
+        <pc:spChg chg="add del">
+          <ac:chgData name="mikez zaatri" userId="dc7c058cd1c617f1" providerId="LiveId" clId="{F255ABD9-DD32-49C2-95D1-D3F9DBAF0468}" dt="2021-08-16T07:13:13.096" v="85" actId="26606"/>
+          <ac:spMkLst>
+            <pc:docMk/>
+            <pc:sldMk cId="95992585" sldId="257"/>
+            <ac:spMk id="38" creationId="{2073ABB4-E164-4CBF-ADFF-25552BB7913B}"/>
+          </ac:spMkLst>
+        </pc:spChg>
+        <pc:spChg chg="add del">
+          <ac:chgData name="mikez zaatri" userId="dc7c058cd1c617f1" providerId="LiveId" clId="{F255ABD9-DD32-49C2-95D1-D3F9DBAF0468}" dt="2021-08-16T07:13:13.096" v="85" actId="26606"/>
+          <ac:spMkLst>
+            <pc:docMk/>
+            <pc:sldMk cId="95992585" sldId="257"/>
+            <ac:spMk id="39" creationId="{0F161291-765C-4033-9E84-52C51C6A5A63}"/>
+          </ac:spMkLst>
+        </pc:spChg>
+        <pc:spChg chg="add del">
+          <ac:chgData name="mikez zaatri" userId="dc7c058cd1c617f1" providerId="LiveId" clId="{F255ABD9-DD32-49C2-95D1-D3F9DBAF0468}" dt="2021-08-16T07:13:13.096" v="85" actId="26606"/>
+          <ac:spMkLst>
+            <pc:docMk/>
+            <pc:sldMk cId="95992585" sldId="257"/>
+            <ac:spMk id="40" creationId="{37F69638-8A6F-45AB-B9EC-9D8C8FC37180}"/>
+          </ac:spMkLst>
+        </pc:spChg>
+        <pc:spChg chg="add del">
+          <ac:chgData name="mikez zaatri" userId="dc7c058cd1c617f1" providerId="LiveId" clId="{F255ABD9-DD32-49C2-95D1-D3F9DBAF0468}" dt="2021-08-16T07:20:09.030" v="253" actId="26606"/>
+          <ac:spMkLst>
+            <pc:docMk/>
+            <pc:sldMk cId="95992585" sldId="257"/>
+            <ac:spMk id="41" creationId="{B42E5253-D3AC-4AC2-B766-8B34F13C2F5E}"/>
+          </ac:spMkLst>
+        </pc:spChg>
+        <pc:spChg chg="add del">
+          <ac:chgData name="mikez zaatri" userId="dc7c058cd1c617f1" providerId="LiveId" clId="{F255ABD9-DD32-49C2-95D1-D3F9DBAF0468}" dt="2021-08-16T07:13:14.393" v="87" actId="26606"/>
+          <ac:spMkLst>
+            <pc:docMk/>
+            <pc:sldMk cId="95992585" sldId="257"/>
+            <ac:spMk id="42" creationId="{C05729A4-6F0F-4423-AD0C-EF27345E6187}"/>
+          </ac:spMkLst>
+        </pc:spChg>
+        <pc:spChg chg="add del">
+          <ac:chgData name="mikez zaatri" userId="dc7c058cd1c617f1" providerId="LiveId" clId="{F255ABD9-DD32-49C2-95D1-D3F9DBAF0468}" dt="2021-08-16T07:13:14.393" v="87" actId="26606"/>
+          <ac:spMkLst>
+            <pc:docMk/>
+            <pc:sldMk cId="95992585" sldId="257"/>
+            <ac:spMk id="43" creationId="{204CB79E-F775-42E6-994C-D5FA8C176B65}"/>
+          </ac:spMkLst>
+        </pc:spChg>
+        <pc:spChg chg="add del">
+          <ac:chgData name="mikez zaatri" userId="dc7c058cd1c617f1" providerId="LiveId" clId="{F255ABD9-DD32-49C2-95D1-D3F9DBAF0468}" dt="2021-08-16T07:13:14.393" v="87" actId="26606"/>
+          <ac:spMkLst>
+            <pc:docMk/>
+            <pc:sldMk cId="95992585" sldId="257"/>
+            <ac:spMk id="44" creationId="{3AAB5B94-95EF-4963-859C-1FA406D62CA2}"/>
+          </ac:spMkLst>
+        </pc:spChg>
+        <pc:spChg chg="add del">
+          <ac:chgData name="mikez zaatri" userId="dc7c058cd1c617f1" providerId="LiveId" clId="{F255ABD9-DD32-49C2-95D1-D3F9DBAF0468}" dt="2021-08-16T07:13:14.393" v="87" actId="26606"/>
+          <ac:spMkLst>
+            <pc:docMk/>
+            <pc:sldMk cId="95992585" sldId="257"/>
+            <ac:spMk id="45" creationId="{00C418F9-B1A3-4097-9C97-E1C9F3149701}"/>
+          </ac:spMkLst>
+        </pc:spChg>
+        <pc:spChg chg="add del">
+          <ac:chgData name="mikez zaatri" userId="dc7c058cd1c617f1" providerId="LiveId" clId="{F255ABD9-DD32-49C2-95D1-D3F9DBAF0468}" dt="2021-08-16T07:13:14.393" v="87" actId="26606"/>
+          <ac:spMkLst>
+            <pc:docMk/>
+            <pc:sldMk cId="95992585" sldId="257"/>
+            <ac:spMk id="46" creationId="{6B5E8ED2-C3EC-40AD-BDB9-27E589B52DAA}"/>
+          </ac:spMkLst>
+        </pc:spChg>
+        <pc:spChg chg="add del">
+          <ac:chgData name="mikez zaatri" userId="dc7c058cd1c617f1" providerId="LiveId" clId="{F255ABD9-DD32-49C2-95D1-D3F9DBAF0468}" dt="2021-08-16T07:20:09.030" v="253" actId="26606"/>
+          <ac:spMkLst>
+            <pc:docMk/>
+            <pc:sldMk cId="95992585" sldId="257"/>
+            <ac:spMk id="47" creationId="{88C97474-5879-4DB5-B4F3-F0357104BC8E}"/>
+          </ac:spMkLst>
+        </pc:spChg>
+        <pc:spChg chg="add del">
+          <ac:chgData name="mikez zaatri" userId="dc7c058cd1c617f1" providerId="LiveId" clId="{F255ABD9-DD32-49C2-95D1-D3F9DBAF0468}" dt="2021-08-16T07:13:16.181" v="89" actId="26606"/>
+          <ac:spMkLst>
+            <pc:docMk/>
+            <pc:sldMk cId="95992585" sldId="257"/>
+            <ac:spMk id="48" creationId="{1DDC3EF6-2EA5-44B3-94C7-9DDA67A127D0}"/>
+          </ac:spMkLst>
+        </pc:spChg>
+        <pc:spChg chg="add del">
+          <ac:chgData name="mikez zaatri" userId="dc7c058cd1c617f1" providerId="LiveId" clId="{F255ABD9-DD32-49C2-95D1-D3F9DBAF0468}" dt="2021-08-16T07:13:16.181" v="89" actId="26606"/>
+          <ac:spMkLst>
+            <pc:docMk/>
+            <pc:sldMk cId="95992585" sldId="257"/>
+            <ac:spMk id="49" creationId="{87925A9A-E9FA-496E-9C09-7C2845E0062B}"/>
+          </ac:spMkLst>
+        </pc:spChg>
+        <pc:spChg chg="add del">
+          <ac:chgData name="mikez zaatri" userId="dc7c058cd1c617f1" providerId="LiveId" clId="{F255ABD9-DD32-49C2-95D1-D3F9DBAF0468}" dt="2021-08-16T07:13:16.181" v="89" actId="26606"/>
+          <ac:spMkLst>
+            <pc:docMk/>
+            <pc:sldMk cId="95992585" sldId="257"/>
+            <ac:spMk id="50" creationId="{2073ABB4-E164-4CBF-ADFF-25552BB7913B}"/>
+          </ac:spMkLst>
+        </pc:spChg>
+        <pc:spChg chg="add del">
+          <ac:chgData name="mikez zaatri" userId="dc7c058cd1c617f1" providerId="LiveId" clId="{F255ABD9-DD32-49C2-95D1-D3F9DBAF0468}" dt="2021-08-16T07:13:16.181" v="89" actId="26606"/>
+          <ac:spMkLst>
+            <pc:docMk/>
+            <pc:sldMk cId="95992585" sldId="257"/>
+            <ac:spMk id="51" creationId="{20C97E5C-C165-417B-BBDE-6701E226BE3D}"/>
+          </ac:spMkLst>
+        </pc:spChg>
+        <pc:spChg chg="add del">
+          <ac:chgData name="mikez zaatri" userId="dc7c058cd1c617f1" providerId="LiveId" clId="{F255ABD9-DD32-49C2-95D1-D3F9DBAF0468}" dt="2021-08-16T07:13:16.181" v="89" actId="26606"/>
+          <ac:spMkLst>
+            <pc:docMk/>
+            <pc:sldMk cId="95992585" sldId="257"/>
+            <ac:spMk id="52" creationId="{95D0E1C6-221C-4835-B0D4-24184F6B6E21}"/>
+          </ac:spMkLst>
+        </pc:spChg>
+        <pc:spChg chg="add del">
+          <ac:chgData name="mikez zaatri" userId="dc7c058cd1c617f1" providerId="LiveId" clId="{F255ABD9-DD32-49C2-95D1-D3F9DBAF0468}" dt="2021-08-16T07:13:16.181" v="89" actId="26606"/>
+          <ac:spMkLst>
+            <pc:docMk/>
+            <pc:sldMk cId="95992585" sldId="257"/>
+            <ac:spMk id="53" creationId="{A98F2782-0AD1-4AB6-BBB8-3BA1BB416CE2}"/>
+          </ac:spMkLst>
+        </pc:spChg>
+        <pc:spChg chg="add del">
+          <ac:chgData name="mikez zaatri" userId="dc7c058cd1c617f1" providerId="LiveId" clId="{F255ABD9-DD32-49C2-95D1-D3F9DBAF0468}" dt="2021-08-16T07:20:09.030" v="253" actId="26606"/>
+          <ac:spMkLst>
+            <pc:docMk/>
+            <pc:sldMk cId="95992585" sldId="257"/>
+            <ac:spMk id="54" creationId="{9831CBB7-4817-4B54-A7F9-0AE2D0C47870}"/>
+          </ac:spMkLst>
+        </pc:spChg>
+        <pc:spChg chg="add del">
+          <ac:chgData name="mikez zaatri" userId="dc7c058cd1c617f1" providerId="LiveId" clId="{F255ABD9-DD32-49C2-95D1-D3F9DBAF0468}" dt="2021-08-16T07:13:18.088" v="91" actId="26606"/>
+          <ac:spMkLst>
+            <pc:docMk/>
+            <pc:sldMk cId="95992585" sldId="257"/>
+            <ac:spMk id="55" creationId="{1DDC3EF6-2EA5-44B3-94C7-9DDA67A127D0}"/>
+          </ac:spMkLst>
+        </pc:spChg>
+        <pc:spChg chg="add del">
+          <ac:chgData name="mikez zaatri" userId="dc7c058cd1c617f1" providerId="LiveId" clId="{F255ABD9-DD32-49C2-95D1-D3F9DBAF0468}" dt="2021-08-16T07:13:18.088" v="91" actId="26606"/>
+          <ac:spMkLst>
+            <pc:docMk/>
+            <pc:sldMk cId="95992585" sldId="257"/>
+            <ac:spMk id="56" creationId="{87925A9A-E9FA-496E-9C09-7C2845E0062B}"/>
+          </ac:spMkLst>
+        </pc:spChg>
+        <pc:spChg chg="add del">
+          <ac:chgData name="mikez zaatri" userId="dc7c058cd1c617f1" providerId="LiveId" clId="{F255ABD9-DD32-49C2-95D1-D3F9DBAF0468}" dt="2021-08-16T07:13:18.088" v="91" actId="26606"/>
+          <ac:spMkLst>
+            <pc:docMk/>
+            <pc:sldMk cId="95992585" sldId="257"/>
+            <ac:spMk id="57" creationId="{2073ABB4-E164-4CBF-ADFF-25552BB7913B}"/>
+          </ac:spMkLst>
+        </pc:spChg>
+        <pc:spChg chg="add del">
+          <ac:chgData name="mikez zaatri" userId="dc7c058cd1c617f1" providerId="LiveId" clId="{F255ABD9-DD32-49C2-95D1-D3F9DBAF0468}" dt="2021-08-16T07:13:18.088" v="91" actId="26606"/>
+          <ac:spMkLst>
+            <pc:docMk/>
+            <pc:sldMk cId="95992585" sldId="257"/>
+            <ac:spMk id="58" creationId="{2F8F80BB-E8B6-43B3-9462-B4D497D2802A}"/>
+          </ac:spMkLst>
+        </pc:spChg>
+        <pc:spChg chg="add del">
+          <ac:chgData name="mikez zaatri" userId="dc7c058cd1c617f1" providerId="LiveId" clId="{F255ABD9-DD32-49C2-95D1-D3F9DBAF0468}" dt="2021-08-16T07:13:18.088" v="91" actId="26606"/>
+          <ac:spMkLst>
+            <pc:docMk/>
+            <pc:sldMk cId="95992585" sldId="257"/>
+            <ac:spMk id="59" creationId="{942C8AD6-8796-482B-ACC1-6D686B08E7AC}"/>
+          </ac:spMkLst>
+        </pc:spChg>
+        <pc:spChg chg="add del">
+          <ac:chgData name="mikez zaatri" userId="dc7c058cd1c617f1" providerId="LiveId" clId="{F255ABD9-DD32-49C2-95D1-D3F9DBAF0468}" dt="2021-08-16T07:13:18.088" v="91" actId="26606"/>
+          <ac:spMkLst>
+            <pc:docMk/>
+            <pc:sldMk cId="95992585" sldId="257"/>
+            <ac:spMk id="60" creationId="{B6B3BF72-6DFA-42DA-A667-9E3A1BCFF7EB}"/>
+          </ac:spMkLst>
+        </pc:spChg>
+        <pc:spChg chg="add del">
+          <ac:chgData name="mikez zaatri" userId="dc7c058cd1c617f1" providerId="LiveId" clId="{F255ABD9-DD32-49C2-95D1-D3F9DBAF0468}" dt="2021-08-16T07:20:09.030" v="253" actId="26606"/>
+          <ac:spMkLst>
+            <pc:docMk/>
+            <pc:sldMk cId="95992585" sldId="257"/>
+            <ac:spMk id="61" creationId="{96BC321D-B05F-4857-8880-97F61B9B7858}"/>
+          </ac:spMkLst>
+        </pc:spChg>
+        <pc:spChg chg="add del">
+          <ac:chgData name="mikez zaatri" userId="dc7c058cd1c617f1" providerId="LiveId" clId="{F255ABD9-DD32-49C2-95D1-D3F9DBAF0468}" dt="2021-08-16T07:13:19.826" v="93" actId="26606"/>
+          <ac:spMkLst>
+            <pc:docMk/>
+            <pc:sldMk cId="95992585" sldId="257"/>
+            <ac:spMk id="62" creationId="{1DDC3EF6-2EA5-44B3-94C7-9DDA67A127D0}"/>
+          </ac:spMkLst>
+        </pc:spChg>
+        <pc:spChg chg="add del">
+          <ac:chgData name="mikez zaatri" userId="dc7c058cd1c617f1" providerId="LiveId" clId="{F255ABD9-DD32-49C2-95D1-D3F9DBAF0468}" dt="2021-08-16T07:13:19.826" v="93" actId="26606"/>
+          <ac:spMkLst>
+            <pc:docMk/>
+            <pc:sldMk cId="95992585" sldId="257"/>
+            <ac:spMk id="63" creationId="{87925A9A-E9FA-496E-9C09-7C2845E0062B}"/>
+          </ac:spMkLst>
+        </pc:spChg>
+        <pc:spChg chg="add del">
+          <ac:chgData name="mikez zaatri" userId="dc7c058cd1c617f1" providerId="LiveId" clId="{F255ABD9-DD32-49C2-95D1-D3F9DBAF0468}" dt="2021-08-16T07:13:19.826" v="93" actId="26606"/>
+          <ac:spMkLst>
+            <pc:docMk/>
+            <pc:sldMk cId="95992585" sldId="257"/>
+            <ac:spMk id="64" creationId="{2073ABB4-E164-4CBF-ADFF-25552BB7913B}"/>
+          </ac:spMkLst>
+        </pc:spChg>
+        <pc:spChg chg="add del">
+          <ac:chgData name="mikez zaatri" userId="dc7c058cd1c617f1" providerId="LiveId" clId="{F255ABD9-DD32-49C2-95D1-D3F9DBAF0468}" dt="2021-08-16T07:13:19.826" v="93" actId="26606"/>
+          <ac:spMkLst>
+            <pc:docMk/>
+            <pc:sldMk cId="95992585" sldId="257"/>
+            <ac:spMk id="65" creationId="{65D9C196-56A3-4D2B-B250-2501F51B4C14}"/>
+          </ac:spMkLst>
+        </pc:spChg>
+        <pc:spChg chg="add del">
+          <ac:chgData name="mikez zaatri" userId="dc7c058cd1c617f1" providerId="LiveId" clId="{F255ABD9-DD32-49C2-95D1-D3F9DBAF0468}" dt="2021-08-16T07:13:19.826" v="93" actId="26606"/>
+          <ac:spMkLst>
+            <pc:docMk/>
+            <pc:sldMk cId="95992585" sldId="257"/>
+            <ac:spMk id="66" creationId="{3A6EBF77-A535-4798-83D5-C5D9C36BFA83}"/>
+          </ac:spMkLst>
+        </pc:spChg>
+        <pc:spChg chg="add del">
+          <ac:chgData name="mikez zaatri" userId="dc7c058cd1c617f1" providerId="LiveId" clId="{F255ABD9-DD32-49C2-95D1-D3F9DBAF0468}" dt="2021-08-16T07:13:19.826" v="93" actId="26606"/>
+          <ac:spMkLst>
+            <pc:docMk/>
+            <pc:sldMk cId="95992585" sldId="257"/>
+            <ac:spMk id="67" creationId="{DDB2DB23-D2D0-4E56-A97D-E9B80FD3E4A7}"/>
+          </ac:spMkLst>
+        </pc:spChg>
+        <pc:spChg chg="add del">
+          <ac:chgData name="mikez zaatri" userId="dc7c058cd1c617f1" providerId="LiveId" clId="{F255ABD9-DD32-49C2-95D1-D3F9DBAF0468}" dt="2021-08-16T07:20:15.446" v="255" actId="26606"/>
+          <ac:spMkLst>
+            <pc:docMk/>
+            <pc:sldMk cId="95992585" sldId="257"/>
+            <ac:spMk id="68" creationId="{DD651B61-325E-4E73-8445-38B0DE8AAAB6}"/>
+          </ac:spMkLst>
+        </pc:spChg>
+        <pc:spChg chg="add del">
+          <ac:chgData name="mikez zaatri" userId="dc7c058cd1c617f1" providerId="LiveId" clId="{F255ABD9-DD32-49C2-95D1-D3F9DBAF0468}" dt="2021-08-16T07:13:22.035" v="95" actId="26606"/>
+          <ac:spMkLst>
+            <pc:docMk/>
+            <pc:sldMk cId="95992585" sldId="257"/>
+            <ac:spMk id="69" creationId="{1DDC3EF6-2EA5-44B3-94C7-9DDA67A127D0}"/>
+          </ac:spMkLst>
+        </pc:spChg>
+        <pc:spChg chg="add del">
+          <ac:chgData name="mikez zaatri" userId="dc7c058cd1c617f1" providerId="LiveId" clId="{F255ABD9-DD32-49C2-95D1-D3F9DBAF0468}" dt="2021-08-16T07:13:22.035" v="95" actId="26606"/>
+          <ac:spMkLst>
+            <pc:docMk/>
+            <pc:sldMk cId="95992585" sldId="257"/>
+            <ac:spMk id="70" creationId="{87925A9A-E9FA-496E-9C09-7C2845E0062B}"/>
+          </ac:spMkLst>
+        </pc:spChg>
+        <pc:spChg chg="add del">
+          <ac:chgData name="mikez zaatri" userId="dc7c058cd1c617f1" providerId="LiveId" clId="{F255ABD9-DD32-49C2-95D1-D3F9DBAF0468}" dt="2021-08-16T07:13:22.035" v="95" actId="26606"/>
+          <ac:spMkLst>
+            <pc:docMk/>
+            <pc:sldMk cId="95992585" sldId="257"/>
+            <ac:spMk id="71" creationId="{2073ABB4-E164-4CBF-ADFF-25552BB7913B}"/>
+          </ac:spMkLst>
+        </pc:spChg>
+        <pc:spChg chg="add del">
+          <ac:chgData name="mikez zaatri" userId="dc7c058cd1c617f1" providerId="LiveId" clId="{F255ABD9-DD32-49C2-95D1-D3F9DBAF0468}" dt="2021-08-16T07:13:22.035" v="95" actId="26606"/>
+          <ac:spMkLst>
+            <pc:docMk/>
+            <pc:sldMk cId="95992585" sldId="257"/>
+            <ac:spMk id="72" creationId="{2F8F80BB-E8B6-43B3-9462-B4D497D2802A}"/>
+          </ac:spMkLst>
+        </pc:spChg>
+        <pc:spChg chg="add del">
+          <ac:chgData name="mikez zaatri" userId="dc7c058cd1c617f1" providerId="LiveId" clId="{F255ABD9-DD32-49C2-95D1-D3F9DBAF0468}" dt="2021-08-16T07:13:22.035" v="95" actId="26606"/>
+          <ac:spMkLst>
+            <pc:docMk/>
+            <pc:sldMk cId="95992585" sldId="257"/>
+            <ac:spMk id="73" creationId="{942C8AD6-8796-482B-ACC1-6D686B08E7AC}"/>
+          </ac:spMkLst>
+        </pc:spChg>
+        <pc:spChg chg="add del">
+          <ac:chgData name="mikez zaatri" userId="dc7c058cd1c617f1" providerId="LiveId" clId="{F255ABD9-DD32-49C2-95D1-D3F9DBAF0468}" dt="2021-08-16T07:13:22.035" v="95" actId="26606"/>
+          <ac:spMkLst>
+            <pc:docMk/>
+            <pc:sldMk cId="95992585" sldId="257"/>
+            <ac:spMk id="74" creationId="{B6B3BF72-6DFA-42DA-A667-9E3A1BCFF7EB}"/>
+          </ac:spMkLst>
+        </pc:spChg>
+        <pc:spChg chg="add del">
+          <ac:chgData name="mikez zaatri" userId="dc7c058cd1c617f1" providerId="LiveId" clId="{F255ABD9-DD32-49C2-95D1-D3F9DBAF0468}" dt="2021-08-16T07:20:15.446" v="255" actId="26606"/>
+          <ac:spMkLst>
+            <pc:docMk/>
+            <pc:sldMk cId="95992585" sldId="257"/>
+            <ac:spMk id="75" creationId="{B42E5253-D3AC-4AC2-B766-8B34F13C2F5E}"/>
+          </ac:spMkLst>
+        </pc:spChg>
+        <pc:spChg chg="add del">
+          <ac:chgData name="mikez zaatri" userId="dc7c058cd1c617f1" providerId="LiveId" clId="{F255ABD9-DD32-49C2-95D1-D3F9DBAF0468}" dt="2021-08-16T07:13:23.635" v="97" actId="26606"/>
+          <ac:spMkLst>
+            <pc:docMk/>
+            <pc:sldMk cId="95992585" sldId="257"/>
+            <ac:spMk id="76" creationId="{1DDC3EF6-2EA5-44B3-94C7-9DDA67A127D0}"/>
+          </ac:spMkLst>
+        </pc:spChg>
+        <pc:spChg chg="add del">
+          <ac:chgData name="mikez zaatri" userId="dc7c058cd1c617f1" providerId="LiveId" clId="{F255ABD9-DD32-49C2-95D1-D3F9DBAF0468}" dt="2021-08-16T07:13:23.635" v="97" actId="26606"/>
+          <ac:spMkLst>
+            <pc:docMk/>
+            <pc:sldMk cId="95992585" sldId="257"/>
+            <ac:spMk id="77" creationId="{87925A9A-E9FA-496E-9C09-7C2845E0062B}"/>
+          </ac:spMkLst>
+        </pc:spChg>
+        <pc:spChg chg="add del">
+          <ac:chgData name="mikez zaatri" userId="dc7c058cd1c617f1" providerId="LiveId" clId="{F255ABD9-DD32-49C2-95D1-D3F9DBAF0468}" dt="2021-08-16T07:13:23.635" v="97" actId="26606"/>
+          <ac:spMkLst>
+            <pc:docMk/>
+            <pc:sldMk cId="95992585" sldId="257"/>
+            <ac:spMk id="78" creationId="{2073ABB4-E164-4CBF-ADFF-25552BB7913B}"/>
+          </ac:spMkLst>
+        </pc:spChg>
+        <pc:spChg chg="add del">
+          <ac:chgData name="mikez zaatri" userId="dc7c058cd1c617f1" providerId="LiveId" clId="{F255ABD9-DD32-49C2-95D1-D3F9DBAF0468}" dt="2021-08-16T07:13:23.635" v="97" actId="26606"/>
+          <ac:spMkLst>
+            <pc:docMk/>
+            <pc:sldMk cId="95992585" sldId="257"/>
+            <ac:spMk id="79" creationId="{20C97E5C-C165-417B-BBDE-6701E226BE3D}"/>
+          </ac:spMkLst>
+        </pc:spChg>
+        <pc:spChg chg="add del">
+          <ac:chgData name="mikez zaatri" userId="dc7c058cd1c617f1" providerId="LiveId" clId="{F255ABD9-DD32-49C2-95D1-D3F9DBAF0468}" dt="2021-08-16T07:13:23.635" v="97" actId="26606"/>
+          <ac:spMkLst>
+            <pc:docMk/>
+            <pc:sldMk cId="95992585" sldId="257"/>
+            <ac:spMk id="80" creationId="{95D0E1C6-221C-4835-B0D4-24184F6B6E21}"/>
+          </ac:spMkLst>
+        </pc:spChg>
+        <pc:spChg chg="add del">
+          <ac:chgData name="mikez zaatri" userId="dc7c058cd1c617f1" providerId="LiveId" clId="{F255ABD9-DD32-49C2-95D1-D3F9DBAF0468}" dt="2021-08-16T07:13:23.635" v="97" actId="26606"/>
+          <ac:spMkLst>
+            <pc:docMk/>
+            <pc:sldMk cId="95992585" sldId="257"/>
+            <ac:spMk id="81" creationId="{A98F2782-0AD1-4AB6-BBB8-3BA1BB416CE2}"/>
+          </ac:spMkLst>
+        </pc:spChg>
+        <pc:spChg chg="add del">
+          <ac:chgData name="mikez zaatri" userId="dc7c058cd1c617f1" providerId="LiveId" clId="{F255ABD9-DD32-49C2-95D1-D3F9DBAF0468}" dt="2021-08-16T07:20:15.446" v="255" actId="26606"/>
+          <ac:spMkLst>
+            <pc:docMk/>
+            <pc:sldMk cId="95992585" sldId="257"/>
+            <ac:spMk id="82" creationId="{10AE8D57-436A-4073-9A75-15BB5949F8B4}"/>
+          </ac:spMkLst>
+        </pc:spChg>
+        <pc:spChg chg="add del">
+          <ac:chgData name="mikez zaatri" userId="dc7c058cd1c617f1" providerId="LiveId" clId="{F255ABD9-DD32-49C2-95D1-D3F9DBAF0468}" dt="2021-08-16T07:13:31.881" v="99" actId="700"/>
+          <ac:spMkLst>
+            <pc:docMk/>
+            <pc:sldMk cId="95992585" sldId="257"/>
+            <ac:spMk id="83" creationId="{C05729A4-6F0F-4423-AD0C-EF27345E6187}"/>
+          </ac:spMkLst>
+        </pc:spChg>
+        <pc:spChg chg="add del">
+          <ac:chgData name="mikez zaatri" userId="dc7c058cd1c617f1" providerId="LiveId" clId="{F255ABD9-DD32-49C2-95D1-D3F9DBAF0468}" dt="2021-08-16T07:13:31.881" v="99" actId="700"/>
+          <ac:spMkLst>
+            <pc:docMk/>
+            <pc:sldMk cId="95992585" sldId="257"/>
+            <ac:spMk id="84" creationId="{204CB79E-F775-42E6-994C-D5FA8C176B65}"/>
+          </ac:spMkLst>
+        </pc:spChg>
+        <pc:spChg chg="add del">
+          <ac:chgData name="mikez zaatri" userId="dc7c058cd1c617f1" providerId="LiveId" clId="{F255ABD9-DD32-49C2-95D1-D3F9DBAF0468}" dt="2021-08-16T07:13:31.881" v="99" actId="700"/>
+          <ac:spMkLst>
+            <pc:docMk/>
+            <pc:sldMk cId="95992585" sldId="257"/>
+            <ac:spMk id="85" creationId="{3AAB5B94-95EF-4963-859C-1FA406D62CA2}"/>
+          </ac:spMkLst>
+        </pc:spChg>
+        <pc:spChg chg="add del">
+          <ac:chgData name="mikez zaatri" userId="dc7c058cd1c617f1" providerId="LiveId" clId="{F255ABD9-DD32-49C2-95D1-D3F9DBAF0468}" dt="2021-08-16T07:13:31.881" v="99" actId="700"/>
+          <ac:spMkLst>
+            <pc:docMk/>
+            <pc:sldMk cId="95992585" sldId="257"/>
+            <ac:spMk id="86" creationId="{00C418F9-B1A3-4097-9C97-E1C9F3149701}"/>
+          </ac:spMkLst>
+        </pc:spChg>
+        <pc:spChg chg="add del">
+          <ac:chgData name="mikez zaatri" userId="dc7c058cd1c617f1" providerId="LiveId" clId="{F255ABD9-DD32-49C2-95D1-D3F9DBAF0468}" dt="2021-08-16T07:13:31.881" v="99" actId="700"/>
+          <ac:spMkLst>
+            <pc:docMk/>
+            <pc:sldMk cId="95992585" sldId="257"/>
+            <ac:spMk id="87" creationId="{6B5E8ED2-C3EC-40AD-BDB9-27E589B52DAA}"/>
+          </ac:spMkLst>
+        </pc:spChg>
+        <pc:spChg chg="add del">
+          <ac:chgData name="mikez zaatri" userId="dc7c058cd1c617f1" providerId="LiveId" clId="{F255ABD9-DD32-49C2-95D1-D3F9DBAF0468}" dt="2021-08-16T07:20:15.446" v="255" actId="26606"/>
+          <ac:spMkLst>
+            <pc:docMk/>
+            <pc:sldMk cId="95992585" sldId="257"/>
+            <ac:spMk id="88" creationId="{E2852671-8EB6-4EAF-8AF8-65CF3FD66456}"/>
+          </ac:spMkLst>
+        </pc:spChg>
+        <pc:spChg chg="add del">
+          <ac:chgData name="mikez zaatri" userId="dc7c058cd1c617f1" providerId="LiveId" clId="{F255ABD9-DD32-49C2-95D1-D3F9DBAF0468}" dt="2021-08-16T07:20:15.446" v="255" actId="26606"/>
+          <ac:spMkLst>
+            <pc:docMk/>
+            <pc:sldMk cId="95992585" sldId="257"/>
+            <ac:spMk id="89" creationId="{26B4480E-B7FF-4481-890E-043A69AE6FE2}"/>
+          </ac:spMkLst>
+        </pc:spChg>
+        <pc:grpChg chg="add del">
+          <ac:chgData name="mikez zaatri" userId="dc7c058cd1c617f1" providerId="LiveId" clId="{F255ABD9-DD32-49C2-95D1-D3F9DBAF0468}" dt="2021-08-16T07:20:15.446" v="255" actId="26606"/>
+          <ac:grpSpMkLst>
+            <pc:docMk/>
+            <pc:sldMk cId="95992585" sldId="257"/>
+            <ac:grpSpMk id="90" creationId="{79394E1F-0B5F-497D-B2A6-8383A2A54834}"/>
+          </ac:grpSpMkLst>
+        </pc:grpChg>
+        <pc:picChg chg="del mod">
+          <ac:chgData name="mikez zaatri" userId="dc7c058cd1c617f1" providerId="LiveId" clId="{F255ABD9-DD32-49C2-95D1-D3F9DBAF0468}" dt="2021-08-16T07:12:58.001" v="73" actId="478"/>
+          <ac:picMkLst>
+            <pc:docMk/>
+            <pc:sldMk cId="95992585" sldId="257"/>
+            <ac:picMk id="2" creationId="{B3BEA21F-3233-4543-BBDC-FEE037AF4CA7}"/>
+          </ac:picMkLst>
+        </pc:picChg>
+        <pc:picChg chg="add del mod">
+          <ac:chgData name="mikez zaatri" userId="dc7c058cd1c617f1" providerId="LiveId" clId="{F255ABD9-DD32-49C2-95D1-D3F9DBAF0468}" dt="2021-08-16T07:14:16.019" v="103" actId="478"/>
+          <ac:picMkLst>
+            <pc:docMk/>
+            <pc:sldMk cId="95992585" sldId="257"/>
+            <ac:picMk id="7" creationId="{73EC9B02-05DA-4931-BCB1-C8C7AFC44F61}"/>
+          </ac:picMkLst>
+        </pc:picChg>
+        <pc:picChg chg="add del mod ord">
+          <ac:chgData name="mikez zaatri" userId="dc7c058cd1c617f1" providerId="LiveId" clId="{F255ABD9-DD32-49C2-95D1-D3F9DBAF0468}" dt="2021-08-16T07:14:46.824" v="108" actId="22"/>
+          <ac:picMkLst>
+            <pc:docMk/>
+            <pc:sldMk cId="95992585" sldId="257"/>
+            <ac:picMk id="13" creationId="{7222C65D-478A-44CD-AC4B-E739CD474557}"/>
+          </ac:picMkLst>
+        </pc:picChg>
+        <pc:picChg chg="add del mod">
+          <ac:chgData name="mikez zaatri" userId="dc7c058cd1c617f1" providerId="LiveId" clId="{F255ABD9-DD32-49C2-95D1-D3F9DBAF0468}" dt="2021-08-16T07:16:48.140" v="137" actId="478"/>
+          <ac:picMkLst>
+            <pc:docMk/>
+            <pc:sldMk cId="95992585" sldId="257"/>
+            <ac:picMk id="17" creationId="{CCD8FEE0-7473-44CA-A9A8-06D537B890DE}"/>
+          </ac:picMkLst>
+        </pc:picChg>
+        <pc:picChg chg="add mod ord">
+          <ac:chgData name="mikez zaatri" userId="dc7c058cd1c617f1" providerId="LiveId" clId="{F255ABD9-DD32-49C2-95D1-D3F9DBAF0468}" dt="2021-08-16T07:20:15.446" v="255" actId="26606"/>
+          <ac:picMkLst>
+            <pc:docMk/>
+            <pc:sldMk cId="95992585" sldId="257"/>
+            <ac:picMk id="21" creationId="{E574263B-434B-452B-A016-0B3F1A9D57A5}"/>
+          </ac:picMkLst>
+        </pc:picChg>
+      </pc:sldChg>
+      <pc:sldChg chg="add del">
+        <pc:chgData name="mikez zaatri" userId="dc7c058cd1c617f1" providerId="LiveId" clId="{F255ABD9-DD32-49C2-95D1-D3F9DBAF0468}" dt="2021-08-16T07:17:34.558" v="145" actId="47"/>
+        <pc:sldMkLst>
+          <pc:docMk/>
+          <pc:sldMk cId="3304426644" sldId="258"/>
+        </pc:sldMkLst>
+      </pc:sldChg>
       <pc:sldChg chg="del">
         <pc:chgData name="mikez zaatri" userId="dc7c058cd1c617f1" providerId="LiveId" clId="{F255ABD9-DD32-49C2-95D1-D3F9DBAF0468}" dt="2021-08-16T07:04:01.225" v="0" actId="2696"/>
         <pc:sldMkLst>
           <pc:docMk/>
-          <pc:sldMk cId="0" sldId="261"/>
+          <pc:sldMk cId="3923756508" sldId="261"/>
         </pc:sldMkLst>
       </pc:sldChg>
       <pc:sldChg chg="add">
@@ -510,7 +1207,7 @@
         <pc:chgData name="mikez zaatri" userId="dc7c058cd1c617f1" providerId="LiveId" clId="{F255ABD9-DD32-49C2-95D1-D3F9DBAF0468}" dt="2021-08-16T07:04:01.225" v="0" actId="2696"/>
         <pc:sldMkLst>
           <pc:docMk/>
-          <pc:sldMk cId="0" sldId="262"/>
+          <pc:sldMk cId="1929161778" sldId="262"/>
         </pc:sldMkLst>
       </pc:sldChg>
       <pc:sldChg chg="add">
@@ -519,6 +1216,186 @@
           <pc:docMk/>
           <pc:sldMk cId="1929161778" sldId="262"/>
         </pc:sldMkLst>
+      </pc:sldChg>
+      <pc:sldChg chg="delSp modSp mod">
+        <pc:chgData name="mikez zaatri" userId="dc7c058cd1c617f1" providerId="LiveId" clId="{F255ABD9-DD32-49C2-95D1-D3F9DBAF0468}" dt="2021-08-16T07:07:51.061" v="44" actId="6549"/>
+        <pc:sldMkLst>
+          <pc:docMk/>
+          <pc:sldMk cId="0" sldId="267"/>
+        </pc:sldMkLst>
+        <pc:spChg chg="del">
+          <ac:chgData name="mikez zaatri" userId="dc7c058cd1c617f1" providerId="LiveId" clId="{F255ABD9-DD32-49C2-95D1-D3F9DBAF0468}" dt="2021-08-16T07:06:30.082" v="2" actId="478"/>
+          <ac:spMkLst>
+            <pc:docMk/>
+            <pc:sldMk cId="0" sldId="267"/>
+            <ac:spMk id="4" creationId="{54751FBC-7BCC-4392-925A-25CAC9EB7E35}"/>
+          </ac:spMkLst>
+        </pc:spChg>
+        <pc:spChg chg="mod">
+          <ac:chgData name="mikez zaatri" userId="dc7c058cd1c617f1" providerId="LiveId" clId="{F255ABD9-DD32-49C2-95D1-D3F9DBAF0468}" dt="2021-08-16T07:07:44.483" v="43" actId="20577"/>
+          <ac:spMkLst>
+            <pc:docMk/>
+            <pc:sldMk cId="0" sldId="267"/>
+            <ac:spMk id="170" creationId="{00000000-0000-0000-0000-000000000000}"/>
+          </ac:spMkLst>
+        </pc:spChg>
+        <pc:spChg chg="mod">
+          <ac:chgData name="mikez zaatri" userId="dc7c058cd1c617f1" providerId="LiveId" clId="{F255ABD9-DD32-49C2-95D1-D3F9DBAF0468}" dt="2021-08-16T07:07:51.061" v="44" actId="6549"/>
+          <ac:spMkLst>
+            <pc:docMk/>
+            <pc:sldMk cId="0" sldId="267"/>
+            <ac:spMk id="171" creationId="{00000000-0000-0000-0000-000000000000}"/>
+          </ac:spMkLst>
+        </pc:spChg>
+      </pc:sldChg>
+      <pc:sldChg chg="add del">
+        <pc:chgData name="mikez zaatri" userId="dc7c058cd1c617f1" providerId="LiveId" clId="{F255ABD9-DD32-49C2-95D1-D3F9DBAF0468}" dt="2021-08-16T07:17:35.564" v="146" actId="47"/>
+        <pc:sldMkLst>
+          <pc:docMk/>
+          <pc:sldMk cId="897138782" sldId="279"/>
+        </pc:sldMkLst>
+      </pc:sldChg>
+      <pc:sldChg chg="addSp delSp modSp add mod setBg setClrOvrMap">
+        <pc:chgData name="mikez zaatri" userId="dc7c058cd1c617f1" providerId="LiveId" clId="{F255ABD9-DD32-49C2-95D1-D3F9DBAF0468}" dt="2021-08-16T07:19:26.004" v="208" actId="20577"/>
+        <pc:sldMkLst>
+          <pc:docMk/>
+          <pc:sldMk cId="425088015" sldId="280"/>
+        </pc:sldMkLst>
+        <pc:spChg chg="mod">
+          <ac:chgData name="mikez zaatri" userId="dc7c058cd1c617f1" providerId="LiveId" clId="{F255ABD9-DD32-49C2-95D1-D3F9DBAF0468}" dt="2021-08-16T07:19:26.004" v="208" actId="20577"/>
+          <ac:spMkLst>
+            <pc:docMk/>
+            <pc:sldMk cId="425088015" sldId="280"/>
+            <ac:spMk id="8" creationId="{26C39FAB-5AD5-4AF2-8970-761429E3AEFC}"/>
+          </ac:spMkLst>
+        </pc:spChg>
+        <pc:spChg chg="mod">
+          <ac:chgData name="mikez zaatri" userId="dc7c058cd1c617f1" providerId="LiveId" clId="{F255ABD9-DD32-49C2-95D1-D3F9DBAF0468}" dt="2021-08-16T07:16:24.444" v="126" actId="26606"/>
+          <ac:spMkLst>
+            <pc:docMk/>
+            <pc:sldMk cId="425088015" sldId="280"/>
+            <ac:spMk id="10" creationId="{B5FEDBAE-ABA3-4F3C-AA95-96E298B91A08}"/>
+          </ac:spMkLst>
+        </pc:spChg>
+        <pc:spChg chg="add del">
+          <ac:chgData name="mikez zaatri" userId="dc7c058cd1c617f1" providerId="LiveId" clId="{F255ABD9-DD32-49C2-95D1-D3F9DBAF0468}" dt="2021-08-16T07:16:24.444" v="126" actId="26606"/>
+          <ac:spMkLst>
+            <pc:docMk/>
+            <pc:sldMk cId="425088015" sldId="280"/>
+            <ac:spMk id="12" creationId="{B5B90362-AFCC-46A9-B41C-A257A8C5B314}"/>
+          </ac:spMkLst>
+        </pc:spChg>
+        <pc:spChg chg="add del">
+          <ac:chgData name="mikez zaatri" userId="dc7c058cd1c617f1" providerId="LiveId" clId="{F255ABD9-DD32-49C2-95D1-D3F9DBAF0468}" dt="2021-08-16T07:16:24.444" v="126" actId="26606"/>
+          <ac:spMkLst>
+            <pc:docMk/>
+            <pc:sldMk cId="425088015" sldId="280"/>
+            <ac:spMk id="15" creationId="{E6C8E6EB-4C59-429B-97E4-72A058CFC4FB}"/>
+          </ac:spMkLst>
+        </pc:spChg>
+        <pc:spChg chg="add del">
+          <ac:chgData name="mikez zaatri" userId="dc7c058cd1c617f1" providerId="LiveId" clId="{F255ABD9-DD32-49C2-95D1-D3F9DBAF0468}" dt="2021-08-16T07:16:24.444" v="126" actId="26606"/>
+          <ac:spMkLst>
+            <pc:docMk/>
+            <pc:sldMk cId="425088015" sldId="280"/>
+            <ac:spMk id="19" creationId="{F71EF7F1-38BA-471D-8CD4-2A9AE8E35527}"/>
+          </ac:spMkLst>
+        </pc:spChg>
+        <pc:spChg chg="add del">
+          <ac:chgData name="mikez zaatri" userId="dc7c058cd1c617f1" providerId="LiveId" clId="{F255ABD9-DD32-49C2-95D1-D3F9DBAF0468}" dt="2021-08-16T07:16:24.444" v="126" actId="26606"/>
+          <ac:spMkLst>
+            <pc:docMk/>
+            <pc:sldMk cId="425088015" sldId="280"/>
+            <ac:spMk id="21" creationId="{1BB56EB9-078F-4952-AC1F-149C7A0AE4D5}"/>
+          </ac:spMkLst>
+        </pc:spChg>
+        <pc:spChg chg="add del">
+          <ac:chgData name="mikez zaatri" userId="dc7c058cd1c617f1" providerId="LiveId" clId="{F255ABD9-DD32-49C2-95D1-D3F9DBAF0468}" dt="2021-08-16T07:16:24.444" v="126" actId="26606"/>
+          <ac:spMkLst>
+            <pc:docMk/>
+            <pc:sldMk cId="425088015" sldId="280"/>
+            <ac:spMk id="23" creationId="{D3772EE4-ED5E-4D3A-A306-B22CF866786D}"/>
+          </ac:spMkLst>
+        </pc:spChg>
+        <pc:spChg chg="add del">
+          <ac:chgData name="mikez zaatri" userId="dc7c058cd1c617f1" providerId="LiveId" clId="{F255ABD9-DD32-49C2-95D1-D3F9DBAF0468}" dt="2021-08-16T07:16:24.444" v="126" actId="26606"/>
+          <ac:spMkLst>
+            <pc:docMk/>
+            <pc:sldMk cId="425088015" sldId="280"/>
+            <ac:spMk id="25" creationId="{10058680-D07C-4893-B2B7-91543F18AB32}"/>
+          </ac:spMkLst>
+        </pc:spChg>
+        <pc:spChg chg="add del">
+          <ac:chgData name="mikez zaatri" userId="dc7c058cd1c617f1" providerId="LiveId" clId="{F255ABD9-DD32-49C2-95D1-D3F9DBAF0468}" dt="2021-08-16T07:16:24.444" v="126" actId="26606"/>
+          <ac:spMkLst>
+            <pc:docMk/>
+            <pc:sldMk cId="425088015" sldId="280"/>
+            <ac:spMk id="27" creationId="{7B42427A-0A1F-4A55-8705-D9179F1E0CFB}"/>
+          </ac:spMkLst>
+        </pc:spChg>
+        <pc:spChg chg="add del">
+          <ac:chgData name="mikez zaatri" userId="dc7c058cd1c617f1" providerId="LiveId" clId="{F255ABD9-DD32-49C2-95D1-D3F9DBAF0468}" dt="2021-08-16T07:16:24.444" v="126" actId="26606"/>
+          <ac:spMkLst>
+            <pc:docMk/>
+            <pc:sldMk cId="425088015" sldId="280"/>
+            <ac:spMk id="29" creationId="{EE54A6FE-D8CB-48A3-900B-053D4EBD3B85}"/>
+          </ac:spMkLst>
+        </pc:spChg>
+        <pc:picChg chg="add mod">
+          <ac:chgData name="mikez zaatri" userId="dc7c058cd1c617f1" providerId="LiveId" clId="{F255ABD9-DD32-49C2-95D1-D3F9DBAF0468}" dt="2021-08-16T07:16:37.867" v="136" actId="1035"/>
+          <ac:picMkLst>
+            <pc:docMk/>
+            <pc:sldMk cId="425088015" sldId="280"/>
+            <ac:picMk id="3" creationId="{ED4111F9-C37C-46CC-AA76-FD010D62D3B4}"/>
+          </ac:picMkLst>
+        </pc:picChg>
+        <pc:picChg chg="del">
+          <ac:chgData name="mikez zaatri" userId="dc7c058cd1c617f1" providerId="LiveId" clId="{F255ABD9-DD32-49C2-95D1-D3F9DBAF0468}" dt="2021-08-16T07:16:12.875" v="121" actId="478"/>
+          <ac:picMkLst>
+            <pc:docMk/>
+            <pc:sldMk cId="425088015" sldId="280"/>
+            <ac:picMk id="17" creationId="{CCD8FEE0-7473-44CA-A9A8-06D537B890DE}"/>
+          </ac:picMkLst>
+        </pc:picChg>
+      </pc:sldChg>
+      <pc:sldChg chg="addSp delSp modSp add mod">
+        <pc:chgData name="mikez zaatri" userId="dc7c058cd1c617f1" providerId="LiveId" clId="{F255ABD9-DD32-49C2-95D1-D3F9DBAF0468}" dt="2021-08-16T07:25:32.276" v="761" actId="6549"/>
+        <pc:sldMkLst>
+          <pc:docMk/>
+          <pc:sldMk cId="2503923824" sldId="281"/>
+        </pc:sldMkLst>
+        <pc:spChg chg="mod">
+          <ac:chgData name="mikez zaatri" userId="dc7c058cd1c617f1" providerId="LiveId" clId="{F255ABD9-DD32-49C2-95D1-D3F9DBAF0468}" dt="2021-08-16T07:20:55.500" v="283" actId="20577"/>
+          <ac:spMkLst>
+            <pc:docMk/>
+            <pc:sldMk cId="2503923824" sldId="281"/>
+            <ac:spMk id="8" creationId="{26C39FAB-5AD5-4AF2-8970-761429E3AEFC}"/>
+          </ac:spMkLst>
+        </pc:spChg>
+        <pc:spChg chg="mod">
+          <ac:chgData name="mikez zaatri" userId="dc7c058cd1c617f1" providerId="LiveId" clId="{F255ABD9-DD32-49C2-95D1-D3F9DBAF0468}" dt="2021-08-16T07:25:32.276" v="761" actId="6549"/>
+          <ac:spMkLst>
+            <pc:docMk/>
+            <pc:sldMk cId="2503923824" sldId="281"/>
+            <ac:spMk id="10" creationId="{B5FEDBAE-ABA3-4F3C-AA95-96E298B91A08}"/>
+          </ac:spMkLst>
+        </pc:spChg>
+        <pc:picChg chg="del">
+          <ac:chgData name="mikez zaatri" userId="dc7c058cd1c617f1" providerId="LiveId" clId="{F255ABD9-DD32-49C2-95D1-D3F9DBAF0468}" dt="2021-08-16T07:17:39.028" v="147" actId="478"/>
+          <ac:picMkLst>
+            <pc:docMk/>
+            <pc:sldMk cId="2503923824" sldId="281"/>
+            <ac:picMk id="3" creationId="{ED4111F9-C37C-46CC-AA76-FD010D62D3B4}"/>
+          </ac:picMkLst>
+        </pc:picChg>
+        <pc:picChg chg="add mod">
+          <ac:chgData name="mikez zaatri" userId="dc7c058cd1c617f1" providerId="LiveId" clId="{F255ABD9-DD32-49C2-95D1-D3F9DBAF0468}" dt="2021-08-16T07:19:04.693" v="157" actId="14100"/>
+          <ac:picMkLst>
+            <pc:docMk/>
+            <pc:sldMk cId="2503923824" sldId="281"/>
+            <ac:picMk id="4" creationId="{BE707EF3-F780-4D11-9A9A-D9916B24B05E}"/>
+          </ac:picMkLst>
+        </pc:picChg>
       </pc:sldChg>
     </pc:docChg>
   </pc:docChgLst>
@@ -533,7 +1410,7 @@
         <pc:chgData name="mikez zaatri" userId="dc7c058cd1c617f1" providerId="LiveId" clId="{3609CF1C-7F59-43CD-9E2F-3C5D15BF5220}" dt="2021-08-08T21:06:15.059" v="136" actId="729"/>
         <pc:sldMkLst>
           <pc:docMk/>
-          <pc:sldMk cId="0" sldId="262"/>
+          <pc:sldMk cId="1929161778" sldId="262"/>
         </pc:sldMkLst>
       </pc:sldChg>
       <pc:sldChg chg="ord">
@@ -8100,7 +8977,7 @@
   <p:cSld>
     <p:spTree>
       <p:nvGrpSpPr>
-        <p:cNvPr id="1" name="Shape 175"/>
+        <p:cNvPr id="1" name=""/>
         <p:cNvGrpSpPr/>
         <p:nvPr/>
       </p:nvGrpSpPr>
@@ -8114,116 +8991,93 @@
       </p:grpSpPr>
       <p:sp>
         <p:nvSpPr>
-          <p:cNvPr id="176" name="Google Shape;176;p20"/>
-          <p:cNvSpPr txBox="1">
+          <p:cNvPr id="8" name="Title 7">
+            <a:extLst>
+              <a:ext uri="{FF2B5EF4-FFF2-40B4-BE49-F238E27FC236}">
+                <a16:creationId xmlns:a16="http://schemas.microsoft.com/office/drawing/2014/main" id="{26C39FAB-5AD5-4AF2-8970-761429E3AEFC}"/>
+              </a:ext>
+            </a:extLst>
+          </p:cNvPr>
+          <p:cNvSpPr>
             <a:spLocks noGrp="1"/>
           </p:cNvSpPr>
           <p:nvPr>
             <p:ph type="title"/>
           </p:nvPr>
         </p:nvSpPr>
-        <p:spPr>
-          <a:xfrm>
-            <a:off x="1730000" y="525000"/>
-            <a:ext cx="9385200" cy="1218800"/>
+        <p:spPr/>
+        <p:txBody>
+          <a:bodyPr/>
+          <a:lstStyle/>
+          <a:p>
+            <a:r>
+              <a:rPr lang="en-US" dirty="0"/>
+              <a:t>House Pricing Regression Charts</a:t>
+            </a:r>
+          </a:p>
+        </p:txBody>
+      </p:sp>
+      <p:sp>
+        <p:nvSpPr>
+          <p:cNvPr id="10" name="Text Placeholder 9">
+            <a:extLst>
+              <a:ext uri="{FF2B5EF4-FFF2-40B4-BE49-F238E27FC236}">
+                <a16:creationId xmlns:a16="http://schemas.microsoft.com/office/drawing/2014/main" id="{B5FEDBAE-ABA3-4F3C-AA95-96E298B91A08}"/>
+              </a:ext>
+            </a:extLst>
+          </p:cNvPr>
+          <p:cNvSpPr>
+            <a:spLocks noGrp="1"/>
+          </p:cNvSpPr>
+          <p:nvPr>
+            <p:ph type="body" sz="half" idx="2"/>
+          </p:nvPr>
+        </p:nvSpPr>
+        <p:spPr/>
+        <p:txBody>
+          <a:bodyPr/>
+          <a:lstStyle/>
+          <a:p>
+            <a:endParaRPr lang="en-US"/>
+          </a:p>
+        </p:txBody>
+      </p:sp>
+      <p:pic>
+        <p:nvPicPr>
+          <p:cNvPr id="3" name="Picture 2" descr="Chart, line chart&#10;&#10;Description automatically generated">
+            <a:extLst>
+              <a:ext uri="{FF2B5EF4-FFF2-40B4-BE49-F238E27FC236}">
+                <a16:creationId xmlns:a16="http://schemas.microsoft.com/office/drawing/2014/main" id="{ED4111F9-C37C-46CC-AA76-FD010D62D3B4}"/>
+              </a:ext>
+            </a:extLst>
+          </p:cNvPr>
+          <p:cNvPicPr>
+            <a:picLocks noChangeAspect="1"/>
+          </p:cNvPicPr>
+          <p:nvPr/>
+        </p:nvPicPr>
+        <p:blipFill>
+          <a:blip r:embed="rId2"/>
+          <a:stretch>
+            <a:fillRect/>
+          </a:stretch>
+        </p:blipFill>
+        <p:spPr>
+          <a:xfrm>
+            <a:off x="4834645" y="612605"/>
+            <a:ext cx="6918575" cy="6196755"/>
           </a:xfrm>
           <a:prstGeom prst="rect">
             <a:avLst/>
           </a:prstGeom>
         </p:spPr>
-        <p:txBody>
-          <a:bodyPr spcFirstLastPara="1" vert="horz" wrap="square" lIns="121900" tIns="121900" rIns="121900" bIns="121900" rtlCol="0" anchor="t" anchorCtr="0">
-            <a:normAutofit/>
-          </a:bodyPr>
-          <a:lstStyle/>
-          <a:p>
-            <a:r>
-              <a:rPr lang="en" sz="2800">
-                <a:latin typeface="Lato"/>
-                <a:ea typeface="Lato"/>
-                <a:cs typeface="Lato"/>
-                <a:sym typeface="Lato"/>
-              </a:rPr>
-              <a:t>Technologies, languages, tools, and algorithms used throughout the project</a:t>
-            </a:r>
-            <a:endParaRPr sz="2800">
-              <a:latin typeface="Lato"/>
-              <a:ea typeface="Lato"/>
-              <a:cs typeface="Lato"/>
-              <a:sym typeface="Lato"/>
-            </a:endParaRPr>
-          </a:p>
-        </p:txBody>
-      </p:sp>
-      <p:sp>
-        <p:nvSpPr>
-          <p:cNvPr id="177" name="Google Shape;177;p20"/>
-          <p:cNvSpPr txBox="1">
-            <a:spLocks noGrp="1"/>
-          </p:cNvSpPr>
-          <p:nvPr>
-            <p:ph type="body" idx="1"/>
-          </p:nvPr>
-        </p:nvSpPr>
-        <p:spPr>
-          <a:xfrm>
-            <a:off x="1730000" y="2090067"/>
-            <a:ext cx="9385200" cy="3881600"/>
-          </a:xfrm>
-          <a:prstGeom prst="rect">
-            <a:avLst/>
-          </a:prstGeom>
-        </p:spPr>
-        <p:txBody>
-          <a:bodyPr spcFirstLastPara="1" vert="horz" wrap="square" lIns="121900" tIns="121900" rIns="121900" bIns="121900" rtlCol="0" anchor="t" anchorCtr="0">
-            <a:normAutofit/>
-          </a:bodyPr>
-          <a:lstStyle/>
-          <a:p>
-            <a:r>
-              <a:rPr lang="en"/>
-              <a:t>Python :  Pandas, PySpark </a:t>
-            </a:r>
-            <a:endParaRPr/>
-          </a:p>
-          <a:p>
-            <a:r>
-              <a:rPr lang="en"/>
-              <a:t>SQLAlchemy </a:t>
-            </a:r>
-            <a:endParaRPr/>
-          </a:p>
-          <a:p>
-            <a:r>
-              <a:rPr lang="en"/>
-              <a:t>Postgres </a:t>
-            </a:r>
-            <a:endParaRPr/>
-          </a:p>
-          <a:p>
-            <a:r>
-              <a:rPr lang="en"/>
-              <a:t>Google CoLab </a:t>
-            </a:r>
-            <a:endParaRPr/>
-          </a:p>
-          <a:p>
-            <a:r>
-              <a:rPr lang="en"/>
-              <a:t>Google Docs. </a:t>
-            </a:r>
-            <a:endParaRPr/>
-          </a:p>
-          <a:p>
-            <a:r>
-              <a:rPr lang="en"/>
-              <a:t>Python ML Models: Linear regression , Keras for neural network ML Model. </a:t>
-            </a:r>
-            <a:endParaRPr/>
-          </a:p>
-        </p:txBody>
-      </p:sp>
+      </p:pic>
     </p:spTree>
+    <p:extLst>
+      <p:ext uri="{BB962C8B-B14F-4D97-AF65-F5344CB8AC3E}">
+        <p14:creationId xmlns:p14="http://schemas.microsoft.com/office/powerpoint/2010/main" val="425088015"/>
+      </p:ext>
+    </p:extLst>
   </p:cSld>
   <p:clrMapOvr>
     <a:masterClrMapping/>
@@ -8232,6 +9086,172 @@
 </file>
 
 <file path=ppt/slides/slide11.xml><?xml version="1.0" encoding="utf-8"?>
+<p:sld xmlns:a="http://schemas.openxmlformats.org/drawingml/2006/main" xmlns:r="http://schemas.openxmlformats.org/officeDocument/2006/relationships" xmlns:p="http://schemas.openxmlformats.org/presentationml/2006/main">
+  <p:cSld>
+    <p:spTree>
+      <p:nvGrpSpPr>
+        <p:cNvPr id="1" name=""/>
+        <p:cNvGrpSpPr/>
+        <p:nvPr/>
+      </p:nvGrpSpPr>
+      <p:grpSpPr>
+        <a:xfrm>
+          <a:off x="0" y="0"/>
+          <a:ext cx="0" cy="0"/>
+          <a:chOff x="0" y="0"/>
+          <a:chExt cx="0" cy="0"/>
+        </a:xfrm>
+      </p:grpSpPr>
+      <p:sp>
+        <p:nvSpPr>
+          <p:cNvPr id="8" name="Title 7">
+            <a:extLst>
+              <a:ext uri="{FF2B5EF4-FFF2-40B4-BE49-F238E27FC236}">
+                <a16:creationId xmlns:a16="http://schemas.microsoft.com/office/drawing/2014/main" id="{26C39FAB-5AD5-4AF2-8970-761429E3AEFC}"/>
+              </a:ext>
+            </a:extLst>
+          </p:cNvPr>
+          <p:cNvSpPr>
+            <a:spLocks noGrp="1"/>
+          </p:cNvSpPr>
+          <p:nvPr>
+            <p:ph type="title"/>
+          </p:nvPr>
+        </p:nvSpPr>
+        <p:spPr/>
+        <p:txBody>
+          <a:bodyPr/>
+          <a:lstStyle/>
+          <a:p>
+            <a:r>
+              <a:rPr lang="en-US" dirty="0"/>
+              <a:t>Housing Analysis Drill down </a:t>
+            </a:r>
+          </a:p>
+        </p:txBody>
+      </p:sp>
+      <p:sp>
+        <p:nvSpPr>
+          <p:cNvPr id="10" name="Text Placeholder 9">
+            <a:extLst>
+              <a:ext uri="{FF2B5EF4-FFF2-40B4-BE49-F238E27FC236}">
+                <a16:creationId xmlns:a16="http://schemas.microsoft.com/office/drawing/2014/main" id="{B5FEDBAE-ABA3-4F3C-AA95-96E298B91A08}"/>
+              </a:ext>
+            </a:extLst>
+          </p:cNvPr>
+          <p:cNvSpPr>
+            <a:spLocks noGrp="1"/>
+          </p:cNvSpPr>
+          <p:nvPr>
+            <p:ph type="body" sz="half" idx="2"/>
+          </p:nvPr>
+        </p:nvSpPr>
+        <p:spPr/>
+        <p:txBody>
+          <a:bodyPr/>
+          <a:lstStyle/>
+          <a:p>
+            <a:pPr marL="285750" indent="-285750">
+              <a:buFont typeface="Arial" panose="020B0604020202020204" pitchFamily="34" charset="0"/>
+              <a:buChar char="•"/>
+            </a:pPr>
+            <a:r>
+              <a:rPr lang="en-US" dirty="0">
+                <a:solidFill>
+                  <a:schemeClr val="bg1"/>
+                </a:solidFill>
+              </a:rPr>
+              <a:t>This Dashboard present :</a:t>
+            </a:r>
+          </a:p>
+          <a:p>
+            <a:pPr marL="742950" lvl="1" indent="-285750">
+              <a:buFont typeface="Arial" panose="020B0604020202020204" pitchFamily="34" charset="0"/>
+              <a:buChar char="•"/>
+            </a:pPr>
+            <a:r>
+              <a:rPr lang="en-US" dirty="0">
+                <a:solidFill>
+                  <a:schemeClr val="bg1"/>
+                </a:solidFill>
+              </a:rPr>
+              <a:t>Days on Market analysis : Avg. Number of Days from Publish to Close .</a:t>
+            </a:r>
+          </a:p>
+          <a:p>
+            <a:pPr marL="742950" lvl="1" indent="-285750">
+              <a:buFont typeface="Arial" panose="020B0604020202020204" pitchFamily="34" charset="0"/>
+              <a:buChar char="•"/>
+            </a:pPr>
+            <a:r>
+              <a:rPr lang="en-US" dirty="0">
+                <a:solidFill>
+                  <a:schemeClr val="bg1"/>
+                </a:solidFill>
+              </a:rPr>
+              <a:t>Sale Distribution Per SQF: Distribution of House sales transactions per SQF.  </a:t>
+            </a:r>
+          </a:p>
+          <a:p>
+            <a:pPr marL="742950" lvl="1" indent="-285750">
+              <a:buFont typeface="Arial" panose="020B0604020202020204" pitchFamily="34" charset="0"/>
+              <a:buChar char="•"/>
+            </a:pPr>
+            <a:r>
+              <a:rPr lang="en-US" dirty="0">
+                <a:solidFill>
+                  <a:schemeClr val="bg1"/>
+                </a:solidFill>
+              </a:rPr>
+              <a:t>Sale Distribution per # of rooms shows the distribution of House sales transactions per # of rooms. </a:t>
+            </a:r>
+          </a:p>
+        </p:txBody>
+      </p:sp>
+      <p:pic>
+        <p:nvPicPr>
+          <p:cNvPr id="4" name="Picture 3" descr="Graphical user interface, application, table&#10;&#10;Description automatically generated">
+            <a:extLst>
+              <a:ext uri="{FF2B5EF4-FFF2-40B4-BE49-F238E27FC236}">
+                <a16:creationId xmlns:a16="http://schemas.microsoft.com/office/drawing/2014/main" id="{BE707EF3-F780-4D11-9A9A-D9916B24B05E}"/>
+              </a:ext>
+            </a:extLst>
+          </p:cNvPr>
+          <p:cNvPicPr>
+            <a:picLocks noChangeAspect="1"/>
+          </p:cNvPicPr>
+          <p:nvPr/>
+        </p:nvPicPr>
+        <p:blipFill>
+          <a:blip r:embed="rId2"/>
+          <a:stretch>
+            <a:fillRect/>
+          </a:stretch>
+        </p:blipFill>
+        <p:spPr>
+          <a:xfrm>
+            <a:off x="4615912" y="607978"/>
+            <a:ext cx="6960003" cy="6235288"/>
+          </a:xfrm>
+          <a:prstGeom prst="rect">
+            <a:avLst/>
+          </a:prstGeom>
+        </p:spPr>
+      </p:pic>
+    </p:spTree>
+    <p:extLst>
+      <p:ext uri="{BB962C8B-B14F-4D97-AF65-F5344CB8AC3E}">
+        <p14:creationId xmlns:p14="http://schemas.microsoft.com/office/powerpoint/2010/main" val="2503923824"/>
+      </p:ext>
+    </p:extLst>
+  </p:cSld>
+  <p:clrMapOvr>
+    <a:masterClrMapping/>
+  </p:clrMapOvr>
+</p:sld>
+</file>
+
+<file path=ppt/slides/slide12.xml><?xml version="1.0" encoding="utf-8"?>
 <p:sld xmlns:a="http://schemas.openxmlformats.org/drawingml/2006/main" xmlns:r="http://schemas.openxmlformats.org/officeDocument/2006/relationships" xmlns:p="http://schemas.openxmlformats.org/presentationml/2006/main">
   <p:cSld>
     <p:spTree>
@@ -8260,6 +9280,299 @@
         </p:nvSpPr>
         <p:spPr>
           <a:xfrm>
+            <a:off x="1730000" y="525000"/>
+            <a:ext cx="9385200" cy="1218800"/>
+          </a:xfrm>
+          <a:prstGeom prst="rect">
+            <a:avLst/>
+          </a:prstGeom>
+        </p:spPr>
+        <p:txBody>
+          <a:bodyPr spcFirstLastPara="1" vert="horz" wrap="square" lIns="121900" tIns="121900" rIns="121900" bIns="121900" rtlCol="0" anchor="t" anchorCtr="0">
+            <a:normAutofit/>
+          </a:bodyPr>
+          <a:lstStyle/>
+          <a:p>
+            <a:r>
+              <a:rPr lang="en" sz="2800">
+                <a:latin typeface="Lato"/>
+                <a:ea typeface="Lato"/>
+                <a:cs typeface="Lato"/>
+                <a:sym typeface="Lato"/>
+              </a:rPr>
+              <a:t>Recommendation for future analysis</a:t>
+            </a:r>
+            <a:endParaRPr sz="2800">
+              <a:latin typeface="Lato"/>
+              <a:ea typeface="Lato"/>
+              <a:cs typeface="Lato"/>
+              <a:sym typeface="Lato"/>
+            </a:endParaRPr>
+          </a:p>
+        </p:txBody>
+      </p:sp>
+      <p:sp>
+        <p:nvSpPr>
+          <p:cNvPr id="183" name="Google Shape;183;p21"/>
+          <p:cNvSpPr txBox="1">
+            <a:spLocks noGrp="1"/>
+          </p:cNvSpPr>
+          <p:nvPr>
+            <p:ph type="body" idx="1"/>
+          </p:nvPr>
+        </p:nvSpPr>
+        <p:spPr>
+          <a:xfrm>
+            <a:off x="1730000" y="2090067"/>
+            <a:ext cx="9385200" cy="3881600"/>
+          </a:xfrm>
+          <a:prstGeom prst="rect">
+            <a:avLst/>
+          </a:prstGeom>
+        </p:spPr>
+        <p:txBody>
+          <a:bodyPr spcFirstLastPara="1" vert="horz" wrap="square" lIns="121900" tIns="121900" rIns="121900" bIns="121900" rtlCol="0" anchor="t" anchorCtr="0">
+            <a:normAutofit/>
+          </a:bodyPr>
+          <a:lstStyle/>
+          <a:p>
+            <a:pPr marL="0" indent="0">
+              <a:spcAft>
+                <a:spcPts val="1600"/>
+              </a:spcAft>
+              <a:buNone/>
+            </a:pPr>
+            <a:r>
+              <a:rPr lang="en"/>
+              <a:t>TBD </a:t>
+            </a:r>
+            <a:endParaRPr/>
+          </a:p>
+        </p:txBody>
+      </p:sp>
+      <p:sp>
+        <p:nvSpPr>
+          <p:cNvPr id="4" name="TextBox 3">
+            <a:extLst>
+              <a:ext uri="{FF2B5EF4-FFF2-40B4-BE49-F238E27FC236}">
+                <a16:creationId xmlns:a16="http://schemas.microsoft.com/office/drawing/2014/main" id="{518EAEA7-0B74-4BEC-9516-1ED4161D7DF1}"/>
+              </a:ext>
+            </a:extLst>
+          </p:cNvPr>
+          <p:cNvSpPr txBox="1"/>
+          <p:nvPr/>
+        </p:nvSpPr>
+        <p:spPr>
+          <a:xfrm>
+            <a:off x="2727159" y="3565175"/>
+            <a:ext cx="6096000" cy="369332"/>
+          </a:xfrm>
+          <a:prstGeom prst="rect">
+            <a:avLst/>
+          </a:prstGeom>
+          <a:noFill/>
+        </p:spPr>
+        <p:txBody>
+          <a:bodyPr wrap="square">
+            <a:spAutoFit/>
+          </a:bodyPr>
+          <a:lstStyle/>
+          <a:p>
+            <a:r>
+              <a:rPr lang="en-US" dirty="0">
+                <a:solidFill>
+                  <a:srgbClr val="FF0000"/>
+                </a:solidFill>
+                <a:highlight>
+                  <a:srgbClr val="FFFF00"/>
+                </a:highlight>
+              </a:rPr>
+              <a:t>Michael</a:t>
+            </a:r>
+            <a:r>
+              <a:rPr lang="en-US" dirty="0">
+                <a:highlight>
+                  <a:srgbClr val="FFFF00"/>
+                </a:highlight>
+              </a:rPr>
+              <a:t>  to add key point to describe the Process </a:t>
+            </a:r>
+          </a:p>
+        </p:txBody>
+      </p:sp>
+    </p:spTree>
+  </p:cSld>
+  <p:clrMapOvr>
+    <a:masterClrMapping/>
+  </p:clrMapOvr>
+</p:sld>
+</file>
+
+<file path=ppt/slides/slide13.xml><?xml version="1.0" encoding="utf-8"?>
+<p:sld xmlns:a="http://schemas.openxmlformats.org/drawingml/2006/main" xmlns:r="http://schemas.openxmlformats.org/officeDocument/2006/relationships" xmlns:p="http://schemas.openxmlformats.org/presentationml/2006/main">
+  <p:cSld>
+    <p:spTree>
+      <p:nvGrpSpPr>
+        <p:cNvPr id="1" name="Shape 175"/>
+        <p:cNvGrpSpPr/>
+        <p:nvPr/>
+      </p:nvGrpSpPr>
+      <p:grpSpPr>
+        <a:xfrm>
+          <a:off x="0" y="0"/>
+          <a:ext cx="0" cy="0"/>
+          <a:chOff x="0" y="0"/>
+          <a:chExt cx="0" cy="0"/>
+        </a:xfrm>
+      </p:grpSpPr>
+      <p:sp>
+        <p:nvSpPr>
+          <p:cNvPr id="176" name="Google Shape;176;p20"/>
+          <p:cNvSpPr txBox="1">
+            <a:spLocks noGrp="1"/>
+          </p:cNvSpPr>
+          <p:nvPr>
+            <p:ph type="title"/>
+          </p:nvPr>
+        </p:nvSpPr>
+        <p:spPr>
+          <a:xfrm>
+            <a:off x="1730000" y="525000"/>
+            <a:ext cx="9385200" cy="1218800"/>
+          </a:xfrm>
+          <a:prstGeom prst="rect">
+            <a:avLst/>
+          </a:prstGeom>
+        </p:spPr>
+        <p:txBody>
+          <a:bodyPr spcFirstLastPara="1" vert="horz" wrap="square" lIns="121900" tIns="121900" rIns="121900" bIns="121900" rtlCol="0" anchor="t" anchorCtr="0">
+            <a:normAutofit/>
+          </a:bodyPr>
+          <a:lstStyle/>
+          <a:p>
+            <a:r>
+              <a:rPr lang="en" sz="2800">
+                <a:latin typeface="Lato"/>
+                <a:ea typeface="Lato"/>
+                <a:cs typeface="Lato"/>
+                <a:sym typeface="Lato"/>
+              </a:rPr>
+              <a:t>Technologies, languages, tools, and algorithms used throughout the project</a:t>
+            </a:r>
+            <a:endParaRPr sz="2800">
+              <a:latin typeface="Lato"/>
+              <a:ea typeface="Lato"/>
+              <a:cs typeface="Lato"/>
+              <a:sym typeface="Lato"/>
+            </a:endParaRPr>
+          </a:p>
+        </p:txBody>
+      </p:sp>
+      <p:sp>
+        <p:nvSpPr>
+          <p:cNvPr id="177" name="Google Shape;177;p20"/>
+          <p:cNvSpPr txBox="1">
+            <a:spLocks noGrp="1"/>
+          </p:cNvSpPr>
+          <p:nvPr>
+            <p:ph type="body" idx="1"/>
+          </p:nvPr>
+        </p:nvSpPr>
+        <p:spPr>
+          <a:xfrm>
+            <a:off x="1730000" y="2090067"/>
+            <a:ext cx="9385200" cy="3881600"/>
+          </a:xfrm>
+          <a:prstGeom prst="rect">
+            <a:avLst/>
+          </a:prstGeom>
+        </p:spPr>
+        <p:txBody>
+          <a:bodyPr spcFirstLastPara="1" vert="horz" wrap="square" lIns="121900" tIns="121900" rIns="121900" bIns="121900" rtlCol="0" anchor="t" anchorCtr="0">
+            <a:normAutofit/>
+          </a:bodyPr>
+          <a:lstStyle/>
+          <a:p>
+            <a:r>
+              <a:rPr lang="en"/>
+              <a:t>Python :  Pandas, PySpark </a:t>
+            </a:r>
+            <a:endParaRPr/>
+          </a:p>
+          <a:p>
+            <a:r>
+              <a:rPr lang="en"/>
+              <a:t>SQLAlchemy </a:t>
+            </a:r>
+            <a:endParaRPr/>
+          </a:p>
+          <a:p>
+            <a:r>
+              <a:rPr lang="en"/>
+              <a:t>Postgres </a:t>
+            </a:r>
+            <a:endParaRPr/>
+          </a:p>
+          <a:p>
+            <a:r>
+              <a:rPr lang="en"/>
+              <a:t>Google CoLab </a:t>
+            </a:r>
+            <a:endParaRPr/>
+          </a:p>
+          <a:p>
+            <a:r>
+              <a:rPr lang="en"/>
+              <a:t>Google Docs. </a:t>
+            </a:r>
+            <a:endParaRPr/>
+          </a:p>
+          <a:p>
+            <a:r>
+              <a:rPr lang="en"/>
+              <a:t>Python ML Models: Linear regression , Keras for neural network ML Model. </a:t>
+            </a:r>
+            <a:endParaRPr/>
+          </a:p>
+        </p:txBody>
+      </p:sp>
+    </p:spTree>
+  </p:cSld>
+  <p:clrMapOvr>
+    <a:masterClrMapping/>
+  </p:clrMapOvr>
+</p:sld>
+</file>
+
+<file path=ppt/slides/slide14.xml><?xml version="1.0" encoding="utf-8"?>
+<p:sld xmlns:a="http://schemas.openxmlformats.org/drawingml/2006/main" xmlns:r="http://schemas.openxmlformats.org/officeDocument/2006/relationships" xmlns:p="http://schemas.openxmlformats.org/presentationml/2006/main">
+  <p:cSld>
+    <p:spTree>
+      <p:nvGrpSpPr>
+        <p:cNvPr id="1" name="Shape 181"/>
+        <p:cNvGrpSpPr/>
+        <p:nvPr/>
+      </p:nvGrpSpPr>
+      <p:grpSpPr>
+        <a:xfrm>
+          <a:off x="0" y="0"/>
+          <a:ext cx="0" cy="0"/>
+          <a:chOff x="0" y="0"/>
+          <a:chExt cx="0" cy="0"/>
+        </a:xfrm>
+      </p:grpSpPr>
+      <p:sp>
+        <p:nvSpPr>
+          <p:cNvPr id="182" name="Google Shape;182;p21"/>
+          <p:cNvSpPr txBox="1">
+            <a:spLocks noGrp="1"/>
+          </p:cNvSpPr>
+          <p:nvPr>
+            <p:ph type="title"/>
+          </p:nvPr>
+        </p:nvSpPr>
+        <p:spPr>
+          <a:xfrm>
             <a:off x="1525814" y="3126157"/>
             <a:ext cx="9385200" cy="1218800"/>
           </a:xfrm>
@@ -8304,7 +9617,7 @@
 </p:sld>
 </file>
 
-<file path=ppt/slides/slide12.xml><?xml version="1.0" encoding="utf-8"?>
+<file path=ppt/slides/slide15.xml><?xml version="1.0" encoding="utf-8"?>
 <p:sld xmlns:a="http://schemas.openxmlformats.org/drawingml/2006/main" xmlns:r="http://schemas.openxmlformats.org/officeDocument/2006/relationships" xmlns:p="http://schemas.openxmlformats.org/presentationml/2006/main">
   <p:cSld>
     <p:spTree>
@@ -8532,7 +9845,7 @@
 </p:sld>
 </file>
 
-<file path=ppt/slides/slide13.xml><?xml version="1.0" encoding="utf-8"?>
+<file path=ppt/slides/slide16.xml><?xml version="1.0" encoding="utf-8"?>
 <p:sld xmlns:a="http://schemas.openxmlformats.org/drawingml/2006/main" xmlns:r="http://schemas.openxmlformats.org/officeDocument/2006/relationships" xmlns:p="http://schemas.openxmlformats.org/presentationml/2006/main" show="0">
   <p:cSld>
     <p:spTree>
@@ -8764,7 +10077,7 @@
 </p:sld>
 </file>
 
-<file path=ppt/slides/slide14.xml><?xml version="1.0" encoding="utf-8"?>
+<file path=ppt/slides/slide17.xml><?xml version="1.0" encoding="utf-8"?>
 <p:sld xmlns:a="http://schemas.openxmlformats.org/drawingml/2006/main" xmlns:r="http://schemas.openxmlformats.org/officeDocument/2006/relationships" xmlns:p="http://schemas.openxmlformats.org/presentationml/2006/main">
   <p:cSld>
     <p:spTree>
@@ -8885,7 +10198,7 @@
 </p:sld>
 </file>
 
-<file path=ppt/slides/slide15.xml><?xml version="1.0" encoding="utf-8"?>
+<file path=ppt/slides/slide18.xml><?xml version="1.0" encoding="utf-8"?>
 <p:sld xmlns:a="http://schemas.openxmlformats.org/drawingml/2006/main" xmlns:r="http://schemas.openxmlformats.org/officeDocument/2006/relationships" xmlns:p="http://schemas.openxmlformats.org/presentationml/2006/main">
   <p:cSld>
     <p:bg>
@@ -9534,7 +10847,7 @@
 </p:sld>
 </file>
 
-<file path=ppt/slides/slide16.xml><?xml version="1.0" encoding="utf-8"?>
+<file path=ppt/slides/slide19.xml><?xml version="1.0" encoding="utf-8"?>
 <p:sld xmlns:a="http://schemas.openxmlformats.org/drawingml/2006/main" xmlns:r="http://schemas.openxmlformats.org/officeDocument/2006/relationships" xmlns:p="http://schemas.openxmlformats.org/presentationml/2006/main">
   <p:cSld>
     <p:spTree>
@@ -9738,375 +11051,6 @@
     <p:extLst>
       <p:ext uri="{BB962C8B-B14F-4D97-AF65-F5344CB8AC3E}">
         <p14:creationId xmlns:p14="http://schemas.microsoft.com/office/powerpoint/2010/main" val="2431828473"/>
-      </p:ext>
-    </p:extLst>
-  </p:cSld>
-  <p:clrMapOvr>
-    <a:masterClrMapping/>
-  </p:clrMapOvr>
-</p:sld>
-</file>
-
-<file path=ppt/slides/slide17.xml><?xml version="1.0" encoding="utf-8"?>
-<p:sld xmlns:a="http://schemas.openxmlformats.org/drawingml/2006/main" xmlns:r="http://schemas.openxmlformats.org/officeDocument/2006/relationships" xmlns:p="http://schemas.openxmlformats.org/presentationml/2006/main">
-  <p:cSld>
-    <p:spTree>
-      <p:nvGrpSpPr>
-        <p:cNvPr id="1" name=""/>
-        <p:cNvGrpSpPr/>
-        <p:nvPr/>
-      </p:nvGrpSpPr>
-      <p:grpSpPr>
-        <a:xfrm>
-          <a:off x="0" y="0"/>
-          <a:ext cx="0" cy="0"/>
-          <a:chOff x="0" y="0"/>
-          <a:chExt cx="0" cy="0"/>
-        </a:xfrm>
-      </p:grpSpPr>
-      <p:sp>
-        <p:nvSpPr>
-          <p:cNvPr id="2" name="Title 1">
-            <a:extLst>
-              <a:ext uri="{FF2B5EF4-FFF2-40B4-BE49-F238E27FC236}">
-                <a16:creationId xmlns:a16="http://schemas.microsoft.com/office/drawing/2014/main" id="{B55F5714-2E8E-4ACD-A2CD-04641C08956A}"/>
-              </a:ext>
-            </a:extLst>
-          </p:cNvPr>
-          <p:cNvSpPr>
-            <a:spLocks noGrp="1"/>
-          </p:cNvSpPr>
-          <p:nvPr>
-            <p:ph type="title"/>
-          </p:nvPr>
-        </p:nvSpPr>
-        <p:spPr>
-          <a:xfrm>
-            <a:off x="601255" y="702155"/>
-            <a:ext cx="3409783" cy="1300365"/>
-          </a:xfrm>
-        </p:spPr>
-        <p:txBody>
-          <a:bodyPr vert="horz" lIns="91440" tIns="45720" rIns="91440" bIns="45720" rtlCol="0" anchor="b">
-            <a:normAutofit/>
-          </a:bodyPr>
-          <a:lstStyle/>
-          <a:p>
-            <a:pPr>
-              <a:spcBef>
-                <a:spcPct val="0"/>
-              </a:spcBef>
-            </a:pPr>
-            <a:r>
-              <a:rPr lang="en-US" sz="2800" dirty="0">
-                <a:solidFill>
-                  <a:srgbClr val="FFFFFF"/>
-                </a:solidFill>
-              </a:rPr>
-              <a:t>Deep Learning  model</a:t>
-            </a:r>
-          </a:p>
-        </p:txBody>
-      </p:sp>
-      <p:sp>
-        <p:nvSpPr>
-          <p:cNvPr id="3" name="Text Placeholder 2">
-            <a:extLst>
-              <a:ext uri="{FF2B5EF4-FFF2-40B4-BE49-F238E27FC236}">
-                <a16:creationId xmlns:a16="http://schemas.microsoft.com/office/drawing/2014/main" id="{69967516-9E99-4B4D-AD6B-5B2B788CBAC4}"/>
-              </a:ext>
-            </a:extLst>
-          </p:cNvPr>
-          <p:cNvSpPr>
-            <a:spLocks noGrp="1"/>
-          </p:cNvSpPr>
-          <p:nvPr>
-            <p:ph type="body" idx="1"/>
-          </p:nvPr>
-        </p:nvSpPr>
-        <p:spPr>
-          <a:xfrm>
-            <a:off x="601255" y="2177142"/>
-            <a:ext cx="3409782" cy="3823607"/>
-          </a:xfrm>
-        </p:spPr>
-        <p:txBody>
-          <a:bodyPr vert="horz" lIns="91440" tIns="45720" rIns="91440" bIns="45720" rtlCol="0" anchor="ctr">
-            <a:normAutofit/>
-          </a:bodyPr>
-          <a:lstStyle/>
-          <a:p>
-            <a:pPr>
-              <a:spcBef>
-                <a:spcPct val="20000"/>
-              </a:spcBef>
-              <a:spcAft>
-                <a:spcPts val="600"/>
-              </a:spcAft>
-              <a:buSzPct val="92000"/>
-              <a:buFont typeface="Wingdings 2" panose="05020102010507070707" pitchFamily="18" charset="2"/>
-              <a:buChar char=""/>
-            </a:pPr>
-            <a:r>
-              <a:rPr lang="en-US" dirty="0">
-                <a:solidFill>
-                  <a:srgbClr val="FFFFFF"/>
-                </a:solidFill>
-              </a:rPr>
-              <a:t>Run ML Neural Network DL ML Model </a:t>
-            </a:r>
-          </a:p>
-        </p:txBody>
-      </p:sp>
-      <p:pic>
-        <p:nvPicPr>
-          <p:cNvPr id="5" name="Picture 4" descr="Text&#10;&#10;Description automatically generated">
-            <a:extLst>
-              <a:ext uri="{FF2B5EF4-FFF2-40B4-BE49-F238E27FC236}">
-                <a16:creationId xmlns:a16="http://schemas.microsoft.com/office/drawing/2014/main" id="{5D8CD567-4A52-4166-8A27-0CD5C20D03BA}"/>
-              </a:ext>
-            </a:extLst>
-          </p:cNvPr>
-          <p:cNvPicPr>
-            <a:picLocks noChangeAspect="1"/>
-          </p:cNvPicPr>
-          <p:nvPr/>
-        </p:nvPicPr>
-        <p:blipFill>
-          <a:blip r:embed="rId2"/>
-          <a:stretch>
-            <a:fillRect/>
-          </a:stretch>
-        </p:blipFill>
-        <p:spPr>
-          <a:xfrm>
-            <a:off x="4592230" y="841237"/>
-            <a:ext cx="7337529" cy="1467504"/>
-          </a:xfrm>
-          <a:prstGeom prst="rect">
-            <a:avLst/>
-          </a:prstGeom>
-        </p:spPr>
-      </p:pic>
-      <p:pic>
-        <p:nvPicPr>
-          <p:cNvPr id="8" name="Picture 7" descr="Text&#10;&#10;Description automatically generated">
-            <a:extLst>
-              <a:ext uri="{FF2B5EF4-FFF2-40B4-BE49-F238E27FC236}">
-                <a16:creationId xmlns:a16="http://schemas.microsoft.com/office/drawing/2014/main" id="{DD4EC2D4-8A09-42FF-AF5F-35A756471C4B}"/>
-              </a:ext>
-            </a:extLst>
-          </p:cNvPr>
-          <p:cNvPicPr>
-            <a:picLocks noChangeAspect="1"/>
-          </p:cNvPicPr>
-          <p:nvPr/>
-        </p:nvPicPr>
-        <p:blipFill>
-          <a:blip r:embed="rId3"/>
-          <a:stretch>
-            <a:fillRect/>
-          </a:stretch>
-        </p:blipFill>
-        <p:spPr>
-          <a:xfrm>
-            <a:off x="4592230" y="2601339"/>
-            <a:ext cx="7335903" cy="3399410"/>
-          </a:xfrm>
-          <a:prstGeom prst="rect">
-            <a:avLst/>
-          </a:prstGeom>
-        </p:spPr>
-      </p:pic>
-    </p:spTree>
-    <p:extLst>
-      <p:ext uri="{BB962C8B-B14F-4D97-AF65-F5344CB8AC3E}">
-        <p14:creationId xmlns:p14="http://schemas.microsoft.com/office/powerpoint/2010/main" val="2030732977"/>
-      </p:ext>
-    </p:extLst>
-  </p:cSld>
-  <p:clrMapOvr>
-    <a:masterClrMapping/>
-  </p:clrMapOvr>
-</p:sld>
-</file>
-
-<file path=ppt/slides/slide18.xml><?xml version="1.0" encoding="utf-8"?>
-<p:sld xmlns:a="http://schemas.openxmlformats.org/drawingml/2006/main" xmlns:r="http://schemas.openxmlformats.org/officeDocument/2006/relationships" xmlns:p="http://schemas.openxmlformats.org/presentationml/2006/main">
-  <p:cSld>
-    <p:spTree>
-      <p:nvGrpSpPr>
-        <p:cNvPr id="1" name=""/>
-        <p:cNvGrpSpPr/>
-        <p:nvPr/>
-      </p:nvGrpSpPr>
-      <p:grpSpPr>
-        <a:xfrm>
-          <a:off x="0" y="0"/>
-          <a:ext cx="0" cy="0"/>
-          <a:chOff x="0" y="0"/>
-          <a:chExt cx="0" cy="0"/>
-        </a:xfrm>
-      </p:grpSpPr>
-      <p:sp>
-        <p:nvSpPr>
-          <p:cNvPr id="2" name="Title 1">
-            <a:extLst>
-              <a:ext uri="{FF2B5EF4-FFF2-40B4-BE49-F238E27FC236}">
-                <a16:creationId xmlns:a16="http://schemas.microsoft.com/office/drawing/2014/main" id="{B55F5714-2E8E-4ACD-A2CD-04641C08956A}"/>
-              </a:ext>
-            </a:extLst>
-          </p:cNvPr>
-          <p:cNvSpPr>
-            <a:spLocks noGrp="1"/>
-          </p:cNvSpPr>
-          <p:nvPr>
-            <p:ph type="title"/>
-          </p:nvPr>
-        </p:nvSpPr>
-        <p:spPr>
-          <a:xfrm>
-            <a:off x="700218" y="1656292"/>
-            <a:ext cx="3150659" cy="2085869"/>
-          </a:xfrm>
-        </p:spPr>
-        <p:txBody>
-          <a:bodyPr vert="horz" lIns="91440" tIns="45720" rIns="91440" bIns="45720" rtlCol="0" anchor="b">
-            <a:normAutofit/>
-          </a:bodyPr>
-          <a:lstStyle/>
-          <a:p>
-            <a:pPr>
-              <a:spcBef>
-                <a:spcPct val="0"/>
-              </a:spcBef>
-            </a:pPr>
-            <a:r>
-              <a:rPr lang="en-US" sz="3600">
-                <a:solidFill>
-                  <a:srgbClr val="FFFFFF"/>
-                </a:solidFill>
-              </a:rPr>
-              <a:t>Deep Learning  model</a:t>
-            </a:r>
-          </a:p>
-        </p:txBody>
-      </p:sp>
-      <p:sp>
-        <p:nvSpPr>
-          <p:cNvPr id="3" name="Text Placeholder 2">
-            <a:extLst>
-              <a:ext uri="{FF2B5EF4-FFF2-40B4-BE49-F238E27FC236}">
-                <a16:creationId xmlns:a16="http://schemas.microsoft.com/office/drawing/2014/main" id="{69967516-9E99-4B4D-AD6B-5B2B788CBAC4}"/>
-              </a:ext>
-            </a:extLst>
-          </p:cNvPr>
-          <p:cNvSpPr>
-            <a:spLocks noGrp="1"/>
-          </p:cNvSpPr>
-          <p:nvPr>
-            <p:ph type="body" idx="1"/>
-          </p:nvPr>
-        </p:nvSpPr>
-        <p:spPr>
-          <a:xfrm>
-            <a:off x="700218" y="3742162"/>
-            <a:ext cx="3150659" cy="1733655"/>
-          </a:xfrm>
-        </p:spPr>
-        <p:txBody>
-          <a:bodyPr vert="horz" lIns="91440" tIns="45720" rIns="91440" bIns="45720" rtlCol="0" anchor="t">
-            <a:normAutofit/>
-          </a:bodyPr>
-          <a:lstStyle/>
-          <a:p>
-            <a:pPr marL="0" indent="0">
-              <a:spcBef>
-                <a:spcPct val="20000"/>
-              </a:spcBef>
-              <a:spcAft>
-                <a:spcPts val="600"/>
-              </a:spcAft>
-              <a:buSzPct val="92000"/>
-              <a:buNone/>
-            </a:pPr>
-            <a:r>
-              <a:rPr lang="en-US" sz="1600" cap="all">
-                <a:solidFill>
-                  <a:srgbClr val="FFFFFF">
-                    <a:alpha val="75000"/>
-                  </a:srgbClr>
-                </a:solidFill>
-              </a:rPr>
-              <a:t>Run ML Neural Network DL ML Model - Cont </a:t>
-            </a:r>
-          </a:p>
-        </p:txBody>
-      </p:sp>
-      <p:pic>
-        <p:nvPicPr>
-          <p:cNvPr id="6" name="Picture 5" descr="Text&#10;&#10;Description automatically generated with medium confidence">
-            <a:extLst>
-              <a:ext uri="{FF2B5EF4-FFF2-40B4-BE49-F238E27FC236}">
-                <a16:creationId xmlns:a16="http://schemas.microsoft.com/office/drawing/2014/main" id="{3F470C4A-4AD1-47A3-A5CA-847F89F3DAB1}"/>
-              </a:ext>
-            </a:extLst>
-          </p:cNvPr>
-          <p:cNvPicPr>
-            <a:picLocks noChangeAspect="1"/>
-          </p:cNvPicPr>
-          <p:nvPr/>
-        </p:nvPicPr>
-        <p:blipFill>
-          <a:blip r:embed="rId2"/>
-          <a:stretch>
-            <a:fillRect/>
-          </a:stretch>
-        </p:blipFill>
-        <p:spPr>
-          <a:xfrm>
-            <a:off x="4625432" y="1633813"/>
-            <a:ext cx="7117916" cy="1997033"/>
-          </a:xfrm>
-          <a:prstGeom prst="rect">
-            <a:avLst/>
-          </a:prstGeom>
-        </p:spPr>
-      </p:pic>
-      <p:pic>
-        <p:nvPicPr>
-          <p:cNvPr id="9" name="Picture 8" descr="Text&#10;&#10;Description automatically generated">
-            <a:extLst>
-              <a:ext uri="{FF2B5EF4-FFF2-40B4-BE49-F238E27FC236}">
-                <a16:creationId xmlns:a16="http://schemas.microsoft.com/office/drawing/2014/main" id="{15A818AF-D1C2-4E14-8314-97A84FE0621D}"/>
-              </a:ext>
-            </a:extLst>
-          </p:cNvPr>
-          <p:cNvPicPr>
-            <a:picLocks noChangeAspect="1"/>
-          </p:cNvPicPr>
-          <p:nvPr/>
-        </p:nvPicPr>
-        <p:blipFill>
-          <a:blip r:embed="rId3"/>
-          <a:stretch>
-            <a:fillRect/>
-          </a:stretch>
-        </p:blipFill>
-        <p:spPr>
-          <a:xfrm>
-            <a:off x="4595946" y="3937465"/>
-            <a:ext cx="7185188" cy="1619955"/>
-          </a:xfrm>
-          <a:prstGeom prst="rect">
-            <a:avLst/>
-          </a:prstGeom>
-        </p:spPr>
-      </p:pic>
-    </p:spTree>
-    <p:extLst>
-      <p:ext uri="{BB962C8B-B14F-4D97-AF65-F5344CB8AC3E}">
-        <p14:creationId xmlns:p14="http://schemas.microsoft.com/office/powerpoint/2010/main" val="4051875976"/>
       </p:ext>
     </p:extLst>
   </p:cSld>
@@ -10259,6 +11203,375 @@
         </p:txBody>
       </p:sp>
     </p:spTree>
+  </p:cSld>
+  <p:clrMapOvr>
+    <a:masterClrMapping/>
+  </p:clrMapOvr>
+</p:sld>
+</file>
+
+<file path=ppt/slides/slide20.xml><?xml version="1.0" encoding="utf-8"?>
+<p:sld xmlns:a="http://schemas.openxmlformats.org/drawingml/2006/main" xmlns:r="http://schemas.openxmlformats.org/officeDocument/2006/relationships" xmlns:p="http://schemas.openxmlformats.org/presentationml/2006/main">
+  <p:cSld>
+    <p:spTree>
+      <p:nvGrpSpPr>
+        <p:cNvPr id="1" name=""/>
+        <p:cNvGrpSpPr/>
+        <p:nvPr/>
+      </p:nvGrpSpPr>
+      <p:grpSpPr>
+        <a:xfrm>
+          <a:off x="0" y="0"/>
+          <a:ext cx="0" cy="0"/>
+          <a:chOff x="0" y="0"/>
+          <a:chExt cx="0" cy="0"/>
+        </a:xfrm>
+      </p:grpSpPr>
+      <p:sp>
+        <p:nvSpPr>
+          <p:cNvPr id="2" name="Title 1">
+            <a:extLst>
+              <a:ext uri="{FF2B5EF4-FFF2-40B4-BE49-F238E27FC236}">
+                <a16:creationId xmlns:a16="http://schemas.microsoft.com/office/drawing/2014/main" id="{B55F5714-2E8E-4ACD-A2CD-04641C08956A}"/>
+              </a:ext>
+            </a:extLst>
+          </p:cNvPr>
+          <p:cNvSpPr>
+            <a:spLocks noGrp="1"/>
+          </p:cNvSpPr>
+          <p:nvPr>
+            <p:ph type="title"/>
+          </p:nvPr>
+        </p:nvSpPr>
+        <p:spPr>
+          <a:xfrm>
+            <a:off x="601255" y="702155"/>
+            <a:ext cx="3409783" cy="1300365"/>
+          </a:xfrm>
+        </p:spPr>
+        <p:txBody>
+          <a:bodyPr vert="horz" lIns="91440" tIns="45720" rIns="91440" bIns="45720" rtlCol="0" anchor="b">
+            <a:normAutofit/>
+          </a:bodyPr>
+          <a:lstStyle/>
+          <a:p>
+            <a:pPr>
+              <a:spcBef>
+                <a:spcPct val="0"/>
+              </a:spcBef>
+            </a:pPr>
+            <a:r>
+              <a:rPr lang="en-US" sz="2800" dirty="0">
+                <a:solidFill>
+                  <a:srgbClr val="FFFFFF"/>
+                </a:solidFill>
+              </a:rPr>
+              <a:t>Deep Learning  model</a:t>
+            </a:r>
+          </a:p>
+        </p:txBody>
+      </p:sp>
+      <p:sp>
+        <p:nvSpPr>
+          <p:cNvPr id="3" name="Text Placeholder 2">
+            <a:extLst>
+              <a:ext uri="{FF2B5EF4-FFF2-40B4-BE49-F238E27FC236}">
+                <a16:creationId xmlns:a16="http://schemas.microsoft.com/office/drawing/2014/main" id="{69967516-9E99-4B4D-AD6B-5B2B788CBAC4}"/>
+              </a:ext>
+            </a:extLst>
+          </p:cNvPr>
+          <p:cNvSpPr>
+            <a:spLocks noGrp="1"/>
+          </p:cNvSpPr>
+          <p:nvPr>
+            <p:ph type="body" idx="1"/>
+          </p:nvPr>
+        </p:nvSpPr>
+        <p:spPr>
+          <a:xfrm>
+            <a:off x="601255" y="2177142"/>
+            <a:ext cx="3409782" cy="3823607"/>
+          </a:xfrm>
+        </p:spPr>
+        <p:txBody>
+          <a:bodyPr vert="horz" lIns="91440" tIns="45720" rIns="91440" bIns="45720" rtlCol="0" anchor="ctr">
+            <a:normAutofit/>
+          </a:bodyPr>
+          <a:lstStyle/>
+          <a:p>
+            <a:pPr>
+              <a:spcBef>
+                <a:spcPct val="20000"/>
+              </a:spcBef>
+              <a:spcAft>
+                <a:spcPts val="600"/>
+              </a:spcAft>
+              <a:buSzPct val="92000"/>
+              <a:buFont typeface="Wingdings 2" panose="05020102010507070707" pitchFamily="18" charset="2"/>
+              <a:buChar char=""/>
+            </a:pPr>
+            <a:r>
+              <a:rPr lang="en-US" dirty="0">
+                <a:solidFill>
+                  <a:srgbClr val="FFFFFF"/>
+                </a:solidFill>
+              </a:rPr>
+              <a:t>Run ML Neural Network DL ML Model </a:t>
+            </a:r>
+          </a:p>
+        </p:txBody>
+      </p:sp>
+      <p:pic>
+        <p:nvPicPr>
+          <p:cNvPr id="5" name="Picture 4" descr="Text&#10;&#10;Description automatically generated">
+            <a:extLst>
+              <a:ext uri="{FF2B5EF4-FFF2-40B4-BE49-F238E27FC236}">
+                <a16:creationId xmlns:a16="http://schemas.microsoft.com/office/drawing/2014/main" id="{5D8CD567-4A52-4166-8A27-0CD5C20D03BA}"/>
+              </a:ext>
+            </a:extLst>
+          </p:cNvPr>
+          <p:cNvPicPr>
+            <a:picLocks noChangeAspect="1"/>
+          </p:cNvPicPr>
+          <p:nvPr/>
+        </p:nvPicPr>
+        <p:blipFill>
+          <a:blip r:embed="rId2"/>
+          <a:stretch>
+            <a:fillRect/>
+          </a:stretch>
+        </p:blipFill>
+        <p:spPr>
+          <a:xfrm>
+            <a:off x="4592230" y="841237"/>
+            <a:ext cx="7337529" cy="1467504"/>
+          </a:xfrm>
+          <a:prstGeom prst="rect">
+            <a:avLst/>
+          </a:prstGeom>
+        </p:spPr>
+      </p:pic>
+      <p:pic>
+        <p:nvPicPr>
+          <p:cNvPr id="8" name="Picture 7" descr="Text&#10;&#10;Description automatically generated">
+            <a:extLst>
+              <a:ext uri="{FF2B5EF4-FFF2-40B4-BE49-F238E27FC236}">
+                <a16:creationId xmlns:a16="http://schemas.microsoft.com/office/drawing/2014/main" id="{DD4EC2D4-8A09-42FF-AF5F-35A756471C4B}"/>
+              </a:ext>
+            </a:extLst>
+          </p:cNvPr>
+          <p:cNvPicPr>
+            <a:picLocks noChangeAspect="1"/>
+          </p:cNvPicPr>
+          <p:nvPr/>
+        </p:nvPicPr>
+        <p:blipFill>
+          <a:blip r:embed="rId3"/>
+          <a:stretch>
+            <a:fillRect/>
+          </a:stretch>
+        </p:blipFill>
+        <p:spPr>
+          <a:xfrm>
+            <a:off x="4592230" y="2601339"/>
+            <a:ext cx="7335903" cy="3399410"/>
+          </a:xfrm>
+          <a:prstGeom prst="rect">
+            <a:avLst/>
+          </a:prstGeom>
+        </p:spPr>
+      </p:pic>
+    </p:spTree>
+    <p:extLst>
+      <p:ext uri="{BB962C8B-B14F-4D97-AF65-F5344CB8AC3E}">
+        <p14:creationId xmlns:p14="http://schemas.microsoft.com/office/powerpoint/2010/main" val="2030732977"/>
+      </p:ext>
+    </p:extLst>
+  </p:cSld>
+  <p:clrMapOvr>
+    <a:masterClrMapping/>
+  </p:clrMapOvr>
+</p:sld>
+</file>
+
+<file path=ppt/slides/slide21.xml><?xml version="1.0" encoding="utf-8"?>
+<p:sld xmlns:a="http://schemas.openxmlformats.org/drawingml/2006/main" xmlns:r="http://schemas.openxmlformats.org/officeDocument/2006/relationships" xmlns:p="http://schemas.openxmlformats.org/presentationml/2006/main">
+  <p:cSld>
+    <p:spTree>
+      <p:nvGrpSpPr>
+        <p:cNvPr id="1" name=""/>
+        <p:cNvGrpSpPr/>
+        <p:nvPr/>
+      </p:nvGrpSpPr>
+      <p:grpSpPr>
+        <a:xfrm>
+          <a:off x="0" y="0"/>
+          <a:ext cx="0" cy="0"/>
+          <a:chOff x="0" y="0"/>
+          <a:chExt cx="0" cy="0"/>
+        </a:xfrm>
+      </p:grpSpPr>
+      <p:sp>
+        <p:nvSpPr>
+          <p:cNvPr id="2" name="Title 1">
+            <a:extLst>
+              <a:ext uri="{FF2B5EF4-FFF2-40B4-BE49-F238E27FC236}">
+                <a16:creationId xmlns:a16="http://schemas.microsoft.com/office/drawing/2014/main" id="{B55F5714-2E8E-4ACD-A2CD-04641C08956A}"/>
+              </a:ext>
+            </a:extLst>
+          </p:cNvPr>
+          <p:cNvSpPr>
+            <a:spLocks noGrp="1"/>
+          </p:cNvSpPr>
+          <p:nvPr>
+            <p:ph type="title"/>
+          </p:nvPr>
+        </p:nvSpPr>
+        <p:spPr>
+          <a:xfrm>
+            <a:off x="700218" y="1656292"/>
+            <a:ext cx="3150659" cy="2085869"/>
+          </a:xfrm>
+        </p:spPr>
+        <p:txBody>
+          <a:bodyPr vert="horz" lIns="91440" tIns="45720" rIns="91440" bIns="45720" rtlCol="0" anchor="b">
+            <a:normAutofit/>
+          </a:bodyPr>
+          <a:lstStyle/>
+          <a:p>
+            <a:pPr>
+              <a:spcBef>
+                <a:spcPct val="0"/>
+              </a:spcBef>
+            </a:pPr>
+            <a:r>
+              <a:rPr lang="en-US" sz="3600">
+                <a:solidFill>
+                  <a:srgbClr val="FFFFFF"/>
+                </a:solidFill>
+              </a:rPr>
+              <a:t>Deep Learning  model</a:t>
+            </a:r>
+          </a:p>
+        </p:txBody>
+      </p:sp>
+      <p:sp>
+        <p:nvSpPr>
+          <p:cNvPr id="3" name="Text Placeholder 2">
+            <a:extLst>
+              <a:ext uri="{FF2B5EF4-FFF2-40B4-BE49-F238E27FC236}">
+                <a16:creationId xmlns:a16="http://schemas.microsoft.com/office/drawing/2014/main" id="{69967516-9E99-4B4D-AD6B-5B2B788CBAC4}"/>
+              </a:ext>
+            </a:extLst>
+          </p:cNvPr>
+          <p:cNvSpPr>
+            <a:spLocks noGrp="1"/>
+          </p:cNvSpPr>
+          <p:nvPr>
+            <p:ph type="body" idx="1"/>
+          </p:nvPr>
+        </p:nvSpPr>
+        <p:spPr>
+          <a:xfrm>
+            <a:off x="700218" y="3742162"/>
+            <a:ext cx="3150659" cy="1733655"/>
+          </a:xfrm>
+        </p:spPr>
+        <p:txBody>
+          <a:bodyPr vert="horz" lIns="91440" tIns="45720" rIns="91440" bIns="45720" rtlCol="0" anchor="t">
+            <a:normAutofit/>
+          </a:bodyPr>
+          <a:lstStyle/>
+          <a:p>
+            <a:pPr marL="0" indent="0">
+              <a:spcBef>
+                <a:spcPct val="20000"/>
+              </a:spcBef>
+              <a:spcAft>
+                <a:spcPts val="600"/>
+              </a:spcAft>
+              <a:buSzPct val="92000"/>
+              <a:buNone/>
+            </a:pPr>
+            <a:r>
+              <a:rPr lang="en-US" sz="1600" cap="all">
+                <a:solidFill>
+                  <a:srgbClr val="FFFFFF">
+                    <a:alpha val="75000"/>
+                  </a:srgbClr>
+                </a:solidFill>
+              </a:rPr>
+              <a:t>Run ML Neural Network DL ML Model - Cont </a:t>
+            </a:r>
+          </a:p>
+        </p:txBody>
+      </p:sp>
+      <p:pic>
+        <p:nvPicPr>
+          <p:cNvPr id="6" name="Picture 5" descr="Text&#10;&#10;Description automatically generated with medium confidence">
+            <a:extLst>
+              <a:ext uri="{FF2B5EF4-FFF2-40B4-BE49-F238E27FC236}">
+                <a16:creationId xmlns:a16="http://schemas.microsoft.com/office/drawing/2014/main" id="{3F470C4A-4AD1-47A3-A5CA-847F89F3DAB1}"/>
+              </a:ext>
+            </a:extLst>
+          </p:cNvPr>
+          <p:cNvPicPr>
+            <a:picLocks noChangeAspect="1"/>
+          </p:cNvPicPr>
+          <p:nvPr/>
+        </p:nvPicPr>
+        <p:blipFill>
+          <a:blip r:embed="rId2"/>
+          <a:stretch>
+            <a:fillRect/>
+          </a:stretch>
+        </p:blipFill>
+        <p:spPr>
+          <a:xfrm>
+            <a:off x="4625432" y="1633813"/>
+            <a:ext cx="7117916" cy="1997033"/>
+          </a:xfrm>
+          <a:prstGeom prst="rect">
+            <a:avLst/>
+          </a:prstGeom>
+        </p:spPr>
+      </p:pic>
+      <p:pic>
+        <p:nvPicPr>
+          <p:cNvPr id="9" name="Picture 8" descr="Text&#10;&#10;Description automatically generated">
+            <a:extLst>
+              <a:ext uri="{FF2B5EF4-FFF2-40B4-BE49-F238E27FC236}">
+                <a16:creationId xmlns:a16="http://schemas.microsoft.com/office/drawing/2014/main" id="{15A818AF-D1C2-4E14-8314-97A84FE0621D}"/>
+              </a:ext>
+            </a:extLst>
+          </p:cNvPr>
+          <p:cNvPicPr>
+            <a:picLocks noChangeAspect="1"/>
+          </p:cNvPicPr>
+          <p:nvPr/>
+        </p:nvPicPr>
+        <p:blipFill>
+          <a:blip r:embed="rId3"/>
+          <a:stretch>
+            <a:fillRect/>
+          </a:stretch>
+        </p:blipFill>
+        <p:spPr>
+          <a:xfrm>
+            <a:off x="4595946" y="3937465"/>
+            <a:ext cx="7185188" cy="1619955"/>
+          </a:xfrm>
+          <a:prstGeom prst="rect">
+            <a:avLst/>
+          </a:prstGeom>
+        </p:spPr>
+      </p:pic>
+    </p:spTree>
+    <p:extLst>
+      <p:ext uri="{BB962C8B-B14F-4D97-AF65-F5344CB8AC3E}">
+        <p14:creationId xmlns:p14="http://schemas.microsoft.com/office/powerpoint/2010/main" val="4051875976"/>
+      </p:ext>
+    </p:extLst>
   </p:cSld>
   <p:clrMapOvr>
     <a:masterClrMapping/>
@@ -11624,7 +12937,7 @@
         <p:spPr>
           <a:xfrm>
             <a:off x="1730000" y="525000"/>
-            <a:ext cx="9385200" cy="1218800"/>
+            <a:ext cx="9385200" cy="750347"/>
           </a:xfrm>
           <a:prstGeom prst="rect">
             <a:avLst/>
@@ -11640,15 +12953,15 @@
               <a:buSzPts val="990"/>
             </a:pPr>
             <a:r>
-              <a:rPr lang="en" sz="2800">
+              <a:rPr lang="en" sz="2800" dirty="0">
                 <a:latin typeface="Lato"/>
                 <a:ea typeface="Lato"/>
                 <a:cs typeface="Lato"/>
                 <a:sym typeface="Lato"/>
               </a:rPr>
-              <a:t>Final Project outcome , Dashboard and visualization</a:t>
-            </a:r>
-            <a:endParaRPr sz="2800">
+              <a:t>Dashboard and visualization using Tableau</a:t>
+            </a:r>
+            <a:endParaRPr sz="2800" dirty="0">
               <a:latin typeface="Lato"/>
               <a:ea typeface="Lato"/>
               <a:cs typeface="Lato"/>
@@ -11669,8 +12982,8 @@
         </p:nvSpPr>
         <p:spPr>
           <a:xfrm>
-            <a:off x="1730000" y="2090067"/>
-            <a:ext cx="9385200" cy="3881600"/>
+            <a:off x="1730000" y="1676400"/>
+            <a:ext cx="9385200" cy="4295267"/>
           </a:xfrm>
           <a:prstGeom prst="rect">
             <a:avLst/>
@@ -11682,85 +12995,7 @@
           </a:bodyPr>
           <a:lstStyle/>
           <a:p>
-            <a:r>
-              <a:rPr lang="en" dirty="0"/>
-              <a:t>Using  Tableau to visualize the following analysis outcome:</a:t>
-            </a:r>
             <a:endParaRPr dirty="0"/>
-          </a:p>
-          <a:p>
-            <a:pPr lvl="1"/>
-            <a:r>
-              <a:rPr lang="en" dirty="0"/>
-              <a:t>Present at the county level in Ca  the  Avg. Sale Price vs. Predicted Ang. Price, Min Max Price Per SQF </a:t>
-            </a:r>
-            <a:endParaRPr dirty="0"/>
-          </a:p>
-          <a:p>
-            <a:pPr lvl="1"/>
-            <a:r>
-              <a:rPr lang="en" dirty="0"/>
-              <a:t>Top 5 Areas with the Highest prices. </a:t>
-            </a:r>
-            <a:endParaRPr dirty="0"/>
-          </a:p>
-          <a:p>
-            <a:pPr lvl="1"/>
-            <a:r>
-              <a:rPr lang="en" dirty="0"/>
-              <a:t>Bottom 5 areas with the lowest prices. l </a:t>
-            </a:r>
-            <a:endParaRPr dirty="0"/>
-          </a:p>
-        </p:txBody>
-      </p:sp>
-      <p:sp>
-        <p:nvSpPr>
-          <p:cNvPr id="4" name="TextBox 3">
-            <a:extLst>
-              <a:ext uri="{FF2B5EF4-FFF2-40B4-BE49-F238E27FC236}">
-                <a16:creationId xmlns:a16="http://schemas.microsoft.com/office/drawing/2014/main" id="{54751FBC-7BCC-4392-925A-25CAC9EB7E35}"/>
-              </a:ext>
-            </a:extLst>
-          </p:cNvPr>
-          <p:cNvSpPr txBox="1"/>
-          <p:nvPr/>
-        </p:nvSpPr>
-        <p:spPr>
-          <a:xfrm>
-            <a:off x="4475748" y="2698902"/>
-            <a:ext cx="6096000" cy="369332"/>
-          </a:xfrm>
-          <a:prstGeom prst="rect">
-            <a:avLst/>
-          </a:prstGeom>
-          <a:noFill/>
-        </p:spPr>
-        <p:txBody>
-          <a:bodyPr wrap="square">
-            <a:spAutoFit/>
-          </a:bodyPr>
-          <a:lstStyle/>
-          <a:p>
-            <a:r>
-              <a:rPr lang="en-US" dirty="0">
-                <a:solidFill>
-                  <a:srgbClr val="FF0000"/>
-                </a:solidFill>
-                <a:highlight>
-                  <a:srgbClr val="FFFF00"/>
-                </a:highlight>
-              </a:rPr>
-              <a:t>Michael</a:t>
-            </a:r>
-            <a:r>
-              <a:rPr lang="en-US" dirty="0">
-                <a:highlight>
-                  <a:srgbClr val="FFFF00"/>
-                </a:highlight>
-              </a:rPr>
-              <a:t>  to add key point to describe the Process </a:t>
-            </a:r>
           </a:p>
         </p:txBody>
       </p:sp>
@@ -11775,9 +13010,17 @@
 <file path=ppt/slides/slide9.xml><?xml version="1.0" encoding="utf-8"?>
 <p:sld xmlns:a="http://schemas.openxmlformats.org/drawingml/2006/main" xmlns:r="http://schemas.openxmlformats.org/officeDocument/2006/relationships" xmlns:p="http://schemas.openxmlformats.org/presentationml/2006/main">
   <p:cSld>
+    <p:bg>
+      <p:bgPr>
+        <a:solidFill>
+          <a:schemeClr val="bg1"/>
+        </a:solidFill>
+        <a:effectLst/>
+      </p:bgPr>
+    </p:bg>
     <p:spTree>
       <p:nvGrpSpPr>
-        <p:cNvPr id="1" name="Shape 181"/>
+        <p:cNvPr id="1" name=""/>
         <p:cNvGrpSpPr/>
         <p:nvPr/>
       </p:nvGrpSpPr>
@@ -11791,137 +13034,93 @@
       </p:grpSpPr>
       <p:sp>
         <p:nvSpPr>
-          <p:cNvPr id="182" name="Google Shape;182;p21"/>
-          <p:cNvSpPr txBox="1">
+          <p:cNvPr id="8" name="Title 7">
+            <a:extLst>
+              <a:ext uri="{FF2B5EF4-FFF2-40B4-BE49-F238E27FC236}">
+                <a16:creationId xmlns:a16="http://schemas.microsoft.com/office/drawing/2014/main" id="{26C39FAB-5AD5-4AF2-8970-761429E3AEFC}"/>
+              </a:ext>
+            </a:extLst>
+          </p:cNvPr>
+          <p:cNvSpPr>
             <a:spLocks noGrp="1"/>
           </p:cNvSpPr>
           <p:nvPr>
             <p:ph type="title"/>
           </p:nvPr>
         </p:nvSpPr>
-        <p:spPr>
-          <a:xfrm>
-            <a:off x="1730000" y="525000"/>
-            <a:ext cx="9385200" cy="1218800"/>
+        <p:spPr/>
+        <p:txBody>
+          <a:bodyPr/>
+          <a:lstStyle/>
+          <a:p>
+            <a:r>
+              <a:rPr lang="en-US" dirty="0"/>
+              <a:t>Housing Heat Maps Per Ang. Prices </a:t>
+            </a:r>
+          </a:p>
+        </p:txBody>
+      </p:sp>
+      <p:sp>
+        <p:nvSpPr>
+          <p:cNvPr id="10" name="Text Placeholder 9">
+            <a:extLst>
+              <a:ext uri="{FF2B5EF4-FFF2-40B4-BE49-F238E27FC236}">
+                <a16:creationId xmlns:a16="http://schemas.microsoft.com/office/drawing/2014/main" id="{B5FEDBAE-ABA3-4F3C-AA95-96E298B91A08}"/>
+              </a:ext>
+            </a:extLst>
+          </p:cNvPr>
+          <p:cNvSpPr>
+            <a:spLocks noGrp="1"/>
+          </p:cNvSpPr>
+          <p:nvPr>
+            <p:ph type="body" sz="half" idx="2"/>
+          </p:nvPr>
+        </p:nvSpPr>
+        <p:spPr/>
+        <p:txBody>
+          <a:bodyPr/>
+          <a:lstStyle/>
+          <a:p>
+            <a:endParaRPr lang="en-US" dirty="0"/>
+          </a:p>
+        </p:txBody>
+      </p:sp>
+      <p:pic>
+        <p:nvPicPr>
+          <p:cNvPr id="21" name="Picture 20" descr="Chart, treemap chart&#10;&#10;Description automatically generated">
+            <a:extLst>
+              <a:ext uri="{FF2B5EF4-FFF2-40B4-BE49-F238E27FC236}">
+                <a16:creationId xmlns:a16="http://schemas.microsoft.com/office/drawing/2014/main" id="{E574263B-434B-452B-A016-0B3F1A9D57A5}"/>
+              </a:ext>
+            </a:extLst>
+          </p:cNvPr>
+          <p:cNvPicPr>
+            <a:picLocks noChangeAspect="1"/>
+          </p:cNvPicPr>
+          <p:nvPr/>
+        </p:nvPicPr>
+        <p:blipFill>
+          <a:blip r:embed="rId2"/>
+          <a:stretch>
+            <a:fillRect/>
+          </a:stretch>
+        </p:blipFill>
+        <p:spPr>
+          <a:xfrm>
+            <a:off x="4595251" y="641616"/>
+            <a:ext cx="6828892" cy="6079787"/>
           </a:xfrm>
           <a:prstGeom prst="rect">
             <a:avLst/>
           </a:prstGeom>
         </p:spPr>
-        <p:txBody>
-          <a:bodyPr spcFirstLastPara="1" vert="horz" wrap="square" lIns="121900" tIns="121900" rIns="121900" bIns="121900" rtlCol="0" anchor="t" anchorCtr="0">
-            <a:normAutofit/>
-          </a:bodyPr>
-          <a:lstStyle/>
-          <a:p>
-            <a:r>
-              <a:rPr lang="en" sz="2800">
-                <a:latin typeface="Lato"/>
-                <a:ea typeface="Lato"/>
-                <a:cs typeface="Lato"/>
-                <a:sym typeface="Lato"/>
-              </a:rPr>
-              <a:t>Recommendation for future analysis</a:t>
-            </a:r>
-            <a:endParaRPr sz="2800">
-              <a:latin typeface="Lato"/>
-              <a:ea typeface="Lato"/>
-              <a:cs typeface="Lato"/>
-              <a:sym typeface="Lato"/>
-            </a:endParaRPr>
-          </a:p>
-        </p:txBody>
-      </p:sp>
-      <p:sp>
-        <p:nvSpPr>
-          <p:cNvPr id="183" name="Google Shape;183;p21"/>
-          <p:cNvSpPr txBox="1">
-            <a:spLocks noGrp="1"/>
-          </p:cNvSpPr>
-          <p:nvPr>
-            <p:ph type="body" idx="1"/>
-          </p:nvPr>
-        </p:nvSpPr>
-        <p:spPr>
-          <a:xfrm>
-            <a:off x="1730000" y="2090067"/>
-            <a:ext cx="9385200" cy="3881600"/>
-          </a:xfrm>
-          <a:prstGeom prst="rect">
-            <a:avLst/>
-          </a:prstGeom>
-        </p:spPr>
-        <p:txBody>
-          <a:bodyPr spcFirstLastPara="1" vert="horz" wrap="square" lIns="121900" tIns="121900" rIns="121900" bIns="121900" rtlCol="0" anchor="t" anchorCtr="0">
-            <a:normAutofit/>
-          </a:bodyPr>
-          <a:lstStyle/>
-          <a:p>
-            <a:pPr marL="0" indent="0">
-              <a:spcAft>
-                <a:spcPts val="1600"/>
-              </a:spcAft>
-              <a:buNone/>
-            </a:pPr>
-            <a:r>
-              <a:rPr lang="en"/>
-              <a:t>TBD </a:t>
-            </a:r>
-            <a:endParaRPr/>
-          </a:p>
-        </p:txBody>
-      </p:sp>
-      <p:sp>
-        <p:nvSpPr>
-          <p:cNvPr id="4" name="TextBox 3">
-            <a:extLst>
-              <a:ext uri="{FF2B5EF4-FFF2-40B4-BE49-F238E27FC236}">
-                <a16:creationId xmlns:a16="http://schemas.microsoft.com/office/drawing/2014/main" id="{518EAEA7-0B74-4BEC-9516-1ED4161D7DF1}"/>
-              </a:ext>
-            </a:extLst>
-          </p:cNvPr>
-          <p:cNvSpPr txBox="1"/>
-          <p:nvPr/>
-        </p:nvSpPr>
-        <p:spPr>
-          <a:xfrm>
-            <a:off x="2727159" y="3565175"/>
-            <a:ext cx="6096000" cy="369332"/>
-          </a:xfrm>
-          <a:prstGeom prst="rect">
-            <a:avLst/>
-          </a:prstGeom>
-          <a:noFill/>
-        </p:spPr>
-        <p:txBody>
-          <a:bodyPr wrap="square">
-            <a:spAutoFit/>
-          </a:bodyPr>
-          <a:lstStyle/>
-          <a:p>
-            <a:r>
-              <a:rPr lang="en-US" dirty="0">
-                <a:solidFill>
-                  <a:srgbClr val="FF0000"/>
-                </a:solidFill>
-                <a:highlight>
-                  <a:srgbClr val="FFFF00"/>
-                </a:highlight>
-              </a:rPr>
-              <a:t>Michael</a:t>
-            </a:r>
-            <a:r>
-              <a:rPr lang="en-US" dirty="0">
-                <a:highlight>
-                  <a:srgbClr val="FFFF00"/>
-                </a:highlight>
-              </a:rPr>
-              <a:t>  to add key point to describe the Process </a:t>
-            </a:r>
-          </a:p>
-        </p:txBody>
-      </p:sp>
+      </p:pic>
     </p:spTree>
+    <p:extLst>
+      <p:ext uri="{BB962C8B-B14F-4D97-AF65-F5344CB8AC3E}">
+        <p14:creationId xmlns:p14="http://schemas.microsoft.com/office/powerpoint/2010/main" val="95992585"/>
+      </p:ext>
+    </p:extLst>
   </p:cSld>
   <p:clrMapOvr>
     <a:masterClrMapping/>
@@ -12494,6 +13693,15 @@
 </file>
 
 <file path=customXml/item1.xml><?xml version="1.0" encoding="utf-8"?>
+<p:properties xmlns:p="http://schemas.microsoft.com/office/2006/metadata/properties" xmlns:xsi="http://www.w3.org/2001/XMLSchema-instance" xmlns:pc="http://schemas.microsoft.com/office/infopath/2007/PartnerControls">
+  <documentManagement>
+    <Status xmlns="71af3243-3dd4-4a8d-8c0d-dd76da1f02a5">Not started</Status>
+    <MediaServiceKeyPoints xmlns="71af3243-3dd4-4a8d-8c0d-dd76da1f02a5" xsi:nil="true"/>
+  </documentManagement>
+</p:properties>
+</file>
+
+<file path=customXml/item2.xml><?xml version="1.0" encoding="utf-8"?>
 <ct:contentTypeSchema xmlns:ct="http://schemas.microsoft.com/office/2006/metadata/contentType" xmlns:ma="http://schemas.microsoft.com/office/2006/metadata/properties/metaAttributes" ct:_="" ma:_="" ma:contentTypeName="Document" ma:contentTypeID="0x01010079F111ED35F8CC479449609E8A0923A6" ma:contentTypeVersion="12" ma:contentTypeDescription="Create a new document." ma:contentTypeScope="" ma:versionID="a410dd7f93c95333ffa1b60ed6adedd1">
   <xsd:schema xmlns:xsd="http://www.w3.org/2001/XMLSchema" xmlns:xs="http://www.w3.org/2001/XMLSchema" xmlns:p="http://schemas.microsoft.com/office/2006/metadata/properties" xmlns:ns2="71af3243-3dd4-4a8d-8c0d-dd76da1f02a5" xmlns:ns3="16c05727-aa75-4e4a-9b5f-8a80a1165891" targetNamespace="http://schemas.microsoft.com/office/2006/metadata/properties" ma:root="true" ma:fieldsID="a936d9baba76aa3866493feff160faab" ns2:_="" ns3:_="">
     <xsd:import namespace="71af3243-3dd4-4a8d-8c0d-dd76da1f02a5"/>
@@ -12714,15 +13922,6 @@
 </ct:contentTypeSchema>
 </file>
 
-<file path=customXml/item2.xml><?xml version="1.0" encoding="utf-8"?>
-<p:properties xmlns:p="http://schemas.microsoft.com/office/2006/metadata/properties" xmlns:xsi="http://www.w3.org/2001/XMLSchema-instance" xmlns:pc="http://schemas.microsoft.com/office/infopath/2007/PartnerControls">
-  <documentManagement>
-    <Status xmlns="71af3243-3dd4-4a8d-8c0d-dd76da1f02a5">Not started</Status>
-    <MediaServiceKeyPoints xmlns="71af3243-3dd4-4a8d-8c0d-dd76da1f02a5" xsi:nil="true"/>
-  </documentManagement>
-</p:properties>
-</file>
-
 <file path=customXml/item3.xml><?xml version="1.0" encoding="utf-8"?>
 <?mso-contentType ?>
 <FormTemplates xmlns="http://schemas.microsoft.com/sharepoint/v3/contenttype/forms">
@@ -12733,6 +13932,16 @@
 </file>
 
 <file path=customXml/itemProps1.xml><?xml version="1.0" encoding="utf-8"?>
+<ds:datastoreItem xmlns:ds="http://schemas.openxmlformats.org/officeDocument/2006/customXml" ds:itemID="{8D289AE2-D2AE-49D1-AFAC-3A79F6794255}">
+  <ds:schemaRefs>
+    <ds:schemaRef ds:uri="http://schemas.microsoft.com/office/2006/metadata/properties"/>
+    <ds:schemaRef ds:uri="http://schemas.microsoft.com/office/infopath/2007/PartnerControls"/>
+    <ds:schemaRef ds:uri="71af3243-3dd4-4a8d-8c0d-dd76da1f02a5"/>
+  </ds:schemaRefs>
+</ds:datastoreItem>
+</file>
+
+<file path=customXml/itemProps2.xml><?xml version="1.0" encoding="utf-8"?>
 <ds:datastoreItem xmlns:ds="http://schemas.openxmlformats.org/officeDocument/2006/customXml" ds:itemID="{41E7CA09-9778-4414-AE97-8064B12DA30E}">
   <ds:schemaRefs>
     <ds:schemaRef ds:uri="http://schemas.microsoft.com/office/2006/metadata/contentType"/>
@@ -12751,16 +13960,6 @@
 </ds:datastoreItem>
 </file>
 
-<file path=customXml/itemProps2.xml><?xml version="1.0" encoding="utf-8"?>
-<ds:datastoreItem xmlns:ds="http://schemas.openxmlformats.org/officeDocument/2006/customXml" ds:itemID="{8D289AE2-D2AE-49D1-AFAC-3A79F6794255}">
-  <ds:schemaRefs>
-    <ds:schemaRef ds:uri="http://schemas.microsoft.com/office/2006/metadata/properties"/>
-    <ds:schemaRef ds:uri="http://schemas.microsoft.com/office/infopath/2007/PartnerControls"/>
-    <ds:schemaRef ds:uri="71af3243-3dd4-4a8d-8c0d-dd76da1f02a5"/>
-  </ds:schemaRefs>
-</ds:datastoreItem>
-</file>
-
 <file path=customXml/itemProps3.xml><?xml version="1.0" encoding="utf-8"?>
 <ds:datastoreItem xmlns:ds="http://schemas.openxmlformats.org/officeDocument/2006/customXml" ds:itemID="{927BD4C1-B6B1-4715-ABF9-E660A51A4EA0}">
   <ds:schemaRefs>

</xml_diff>